<commit_message>
refactor user model to be a child of Identity. Role is linked to Identity.
</commit_message>
<xml_diff>
--- a/docs/draft/login.pptx
+++ b/docs/draft/login.pptx
@@ -128,7 +128,7 @@
 <file path=ppt/revisionInfo.xml><?xml version="1.0" encoding="utf-8"?>
 <p1510:revInfo xmlns:a="http://schemas.openxmlformats.org/drawingml/2006/main" xmlns:r="http://schemas.openxmlformats.org/officeDocument/2006/relationships" xmlns:p1510="http://schemas.microsoft.com/office/powerpoint/2015/10/main">
   <p1510:revLst>
-    <p1510:client id="{C60EBF00-23D1-EC43-80FC-D814DB69B47B}" v="909" dt="2021-03-02T16:05:26.869"/>
+    <p1510:client id="{C60EBF00-23D1-EC43-80FC-D814DB69B47B}" v="914" dt="2021-04-15T08:40:12.105"/>
   </p1510:revLst>
 </p1510:revInfo>
 </file>
@@ -282,7 +282,7 @@
           <a:p>
             <a:fld id="{A3602159-DCB3-864E-86CF-84BE81740A90}" type="datetimeFigureOut">
               <a:rPr lang="en-US" smtClean="0"/>
-              <a:t>3/9/21</a:t>
+              <a:t>4/15/21</a:t>
             </a:fld>
             <a:endParaRPr lang="en-US"/>
           </a:p>
@@ -482,7 +482,7 @@
           <a:p>
             <a:fld id="{A3602159-DCB3-864E-86CF-84BE81740A90}" type="datetimeFigureOut">
               <a:rPr lang="en-US" smtClean="0"/>
-              <a:t>3/9/21</a:t>
+              <a:t>4/15/21</a:t>
             </a:fld>
             <a:endParaRPr lang="en-US"/>
           </a:p>
@@ -692,7 +692,7 @@
           <a:p>
             <a:fld id="{A3602159-DCB3-864E-86CF-84BE81740A90}" type="datetimeFigureOut">
               <a:rPr lang="en-US" smtClean="0"/>
-              <a:t>3/9/21</a:t>
+              <a:t>4/15/21</a:t>
             </a:fld>
             <a:endParaRPr lang="en-US"/>
           </a:p>
@@ -892,7 +892,7 @@
           <a:p>
             <a:fld id="{A3602159-DCB3-864E-86CF-84BE81740A90}" type="datetimeFigureOut">
               <a:rPr lang="en-US" smtClean="0"/>
-              <a:t>3/9/21</a:t>
+              <a:t>4/15/21</a:t>
             </a:fld>
             <a:endParaRPr lang="en-US"/>
           </a:p>
@@ -1168,7 +1168,7 @@
           <a:p>
             <a:fld id="{A3602159-DCB3-864E-86CF-84BE81740A90}" type="datetimeFigureOut">
               <a:rPr lang="en-US" smtClean="0"/>
-              <a:t>3/9/21</a:t>
+              <a:t>4/15/21</a:t>
             </a:fld>
             <a:endParaRPr lang="en-US"/>
           </a:p>
@@ -1436,7 +1436,7 @@
           <a:p>
             <a:fld id="{A3602159-DCB3-864E-86CF-84BE81740A90}" type="datetimeFigureOut">
               <a:rPr lang="en-US" smtClean="0"/>
-              <a:t>3/9/21</a:t>
+              <a:t>4/15/21</a:t>
             </a:fld>
             <a:endParaRPr lang="en-US"/>
           </a:p>
@@ -1851,7 +1851,7 @@
           <a:p>
             <a:fld id="{A3602159-DCB3-864E-86CF-84BE81740A90}" type="datetimeFigureOut">
               <a:rPr lang="en-US" smtClean="0"/>
-              <a:t>3/9/21</a:t>
+              <a:t>4/15/21</a:t>
             </a:fld>
             <a:endParaRPr lang="en-US"/>
           </a:p>
@@ -1993,7 +1993,7 @@
           <a:p>
             <a:fld id="{A3602159-DCB3-864E-86CF-84BE81740A90}" type="datetimeFigureOut">
               <a:rPr lang="en-US" smtClean="0"/>
-              <a:t>3/9/21</a:t>
+              <a:t>4/15/21</a:t>
             </a:fld>
             <a:endParaRPr lang="en-US"/>
           </a:p>
@@ -2106,7 +2106,7 @@
           <a:p>
             <a:fld id="{A3602159-DCB3-864E-86CF-84BE81740A90}" type="datetimeFigureOut">
               <a:rPr lang="en-US" smtClean="0"/>
-              <a:t>3/9/21</a:t>
+              <a:t>4/15/21</a:t>
             </a:fld>
             <a:endParaRPr lang="en-US"/>
           </a:p>
@@ -2419,7 +2419,7 @@
           <a:p>
             <a:fld id="{A3602159-DCB3-864E-86CF-84BE81740A90}" type="datetimeFigureOut">
               <a:rPr lang="en-US" smtClean="0"/>
-              <a:t>3/9/21</a:t>
+              <a:t>4/15/21</a:t>
             </a:fld>
             <a:endParaRPr lang="en-US"/>
           </a:p>
@@ -2708,7 +2708,7 @@
           <a:p>
             <a:fld id="{A3602159-DCB3-864E-86CF-84BE81740A90}" type="datetimeFigureOut">
               <a:rPr lang="en-US" smtClean="0"/>
-              <a:t>3/9/21</a:t>
+              <a:t>4/15/21</a:t>
             </a:fld>
             <a:endParaRPr lang="en-US"/>
           </a:p>
@@ -2951,7 +2951,7 @@
           <a:p>
             <a:fld id="{A3602159-DCB3-864E-86CF-84BE81740A90}" type="datetimeFigureOut">
               <a:rPr lang="en-US" smtClean="0"/>
-              <a:t>3/9/21</a:t>
+              <a:t>4/15/21</a:t>
             </a:fld>
             <a:endParaRPr lang="en-US"/>
           </a:p>
@@ -7640,7 +7640,7 @@
           <a:lstStyle/>
           <a:p>
             <a:r>
-              <a:rPr lang="en-US"/>
+              <a:rPr lang="en-US" dirty="0"/>
               <a:t>model</a:t>
             </a:r>
           </a:p>
@@ -7697,7 +7697,7 @@
           <a:p>
             <a:pPr algn="ctr"/>
             <a:r>
-              <a:rPr lang="en-US"/>
+              <a:rPr lang="en-US" dirty="0"/>
               <a:t>user</a:t>
             </a:r>
           </a:p>
@@ -7774,7 +7774,7 @@
         </p:nvSpPr>
         <p:spPr>
           <a:xfrm>
-            <a:off x="5611868" y="2167642"/>
+            <a:off x="8001385" y="2167642"/>
             <a:ext cx="1403133" cy="420414"/>
           </a:xfrm>
           <a:prstGeom prst="rect">
@@ -7831,7 +7831,7 @@
         </p:nvSpPr>
         <p:spPr>
           <a:xfrm>
-            <a:off x="8016185" y="2167642"/>
+            <a:off x="10405702" y="2167642"/>
             <a:ext cx="1403133" cy="420414"/>
           </a:xfrm>
           <a:prstGeom prst="rect">
@@ -7889,7 +7889,7 @@
         <p:spPr>
           <a:xfrm>
             <a:off x="3346722" y="2709333"/>
-            <a:ext cx="1117614" cy="1015663"/>
+            <a:ext cx="1069973" cy="646331"/>
           </a:xfrm>
           <a:prstGeom prst="rect">
             <a:avLst/>
@@ -7907,8 +7907,8 @@
               <a:buChar char="•"/>
             </a:pPr>
             <a:r>
-              <a:rPr lang="en-US" sz="1200" b="1"/>
-              <a:t>Id</a:t>
+              <a:rPr lang="en-US" sz="1200" dirty="0"/>
+              <a:t>Name</a:t>
             </a:r>
           </a:p>
           <a:p>
@@ -7917,9 +7917,10 @@
               <a:buChar char="•"/>
             </a:pPr>
             <a:r>
-              <a:rPr lang="en-US" sz="1200"/>
-              <a:t>Username</a:t>
-            </a:r>
+              <a:rPr lang="en-US" sz="1200" dirty="0" err="1"/>
+              <a:t>firstname</a:t>
+            </a:r>
+            <a:endParaRPr lang="en-US" sz="1200" dirty="0"/>
           </a:p>
           <a:p>
             <a:pPr marL="285750" indent="-285750">
@@ -7927,20 +7928,65 @@
               <a:buChar char="•"/>
             </a:pPr>
             <a:r>
-              <a:rPr lang="en-US" sz="1200"/>
-              <a:t>Name</a:t>
-            </a:r>
-          </a:p>
+              <a:rPr lang="en-US" sz="1200" dirty="0" err="1"/>
+              <a:t>Pwd</a:t>
+            </a:r>
+            <a:endParaRPr lang="en-US" sz="1200" dirty="0"/>
+          </a:p>
+        </p:txBody>
+      </p:sp>
+      <p:sp>
+        <p:nvSpPr>
+          <p:cNvPr id="34" name="ZoneTexte 33">
+            <a:extLst>
+              <a:ext uri="{FF2B5EF4-FFF2-40B4-BE49-F238E27FC236}">
+                <a16:creationId xmlns:a16="http://schemas.microsoft.com/office/drawing/2014/main" id="{0DF32139-2495-064C-8A37-55B68DCBC60B}"/>
+              </a:ext>
+            </a:extLst>
+          </p:cNvPr>
+          <p:cNvSpPr txBox="1"/>
+          <p:nvPr/>
+        </p:nvSpPr>
+        <p:spPr>
+          <a:xfrm>
+            <a:off x="1005703" y="2823272"/>
+            <a:ext cx="1802288" cy="646331"/>
+          </a:xfrm>
+          <a:prstGeom prst="rect">
+            <a:avLst/>
+          </a:prstGeom>
+          <a:noFill/>
+        </p:spPr>
+        <p:txBody>
+          <a:bodyPr wrap="none" rtlCol="0">
+            <a:spAutoFit/>
+          </a:bodyPr>
+          <a:lstStyle/>
           <a:p>
             <a:pPr marL="285750" indent="-285750">
               <a:buFont typeface="Arial" panose="020B0604020202020204" pitchFamily="34" charset="0"/>
               <a:buChar char="•"/>
             </a:pPr>
             <a:r>
-              <a:rPr lang="en-US" sz="1200" err="1"/>
-              <a:t>firstname</a:t>
-            </a:r>
-            <a:endParaRPr lang="en-US" sz="1200"/>
+              <a:rPr lang="en-US" sz="1200" b="1"/>
+              <a:t>Id (</a:t>
+            </a:r>
+            <a:r>
+              <a:rPr lang="en-US" sz="1200" b="1" err="1"/>
+              <a:t>uuid</a:t>
+            </a:r>
+            <a:r>
+              <a:rPr lang="en-US" sz="1200" b="1"/>
+              <a:t> or </a:t>
+            </a:r>
+            <a:r>
+              <a:rPr lang="en-US" sz="1200" b="1" err="1"/>
+              <a:t>ldap</a:t>
+            </a:r>
+            <a:r>
+              <a:rPr lang="en-US" sz="1200" b="1"/>
+              <a:t>)</a:t>
+            </a:r>
           </a:p>
           <a:p>
             <a:pPr marL="285750" indent="-285750">
@@ -7948,74 +7994,65 @@
               <a:buChar char="•"/>
             </a:pPr>
             <a:r>
-              <a:rPr lang="en-US" sz="1200" err="1"/>
-              <a:t>pwd</a:t>
-            </a:r>
-            <a:endParaRPr lang="en-US" sz="1200"/>
-          </a:p>
-        </p:txBody>
-      </p:sp>
-      <p:sp>
-        <p:nvSpPr>
-          <p:cNvPr id="34" name="ZoneTexte 33">
-            <a:extLst>
-              <a:ext uri="{FF2B5EF4-FFF2-40B4-BE49-F238E27FC236}">
-                <a16:creationId xmlns:a16="http://schemas.microsoft.com/office/drawing/2014/main" id="{0DF32139-2495-064C-8A37-55B68DCBC60B}"/>
-              </a:ext>
-            </a:extLst>
-          </p:cNvPr>
-          <p:cNvSpPr txBox="1"/>
-          <p:nvPr/>
-        </p:nvSpPr>
-        <p:spPr>
-          <a:xfrm>
-            <a:off x="1005703" y="2823272"/>
-            <a:ext cx="1802288" cy="646331"/>
-          </a:xfrm>
-          <a:prstGeom prst="rect">
-            <a:avLst/>
-          </a:prstGeom>
-          <a:noFill/>
-        </p:spPr>
-        <p:txBody>
-          <a:bodyPr wrap="none" rtlCol="0">
-            <a:spAutoFit/>
-          </a:bodyPr>
-          <a:lstStyle/>
+              <a:rPr lang="en-US" sz="1200"/>
+              <a:t>Name</a:t>
+            </a:r>
+          </a:p>
           <a:p>
             <a:pPr marL="285750" indent="-285750">
               <a:buFont typeface="Arial" panose="020B0604020202020204" pitchFamily="34" charset="0"/>
               <a:buChar char="•"/>
             </a:pPr>
             <a:r>
-              <a:rPr lang="en-US" sz="1200" b="1"/>
-              <a:t>Id (</a:t>
-            </a:r>
-            <a:r>
-              <a:rPr lang="en-US" sz="1200" b="1" err="1"/>
-              <a:t>uuid</a:t>
-            </a:r>
-            <a:r>
-              <a:rPr lang="en-US" sz="1200" b="1"/>
-              <a:t> or </a:t>
-            </a:r>
-            <a:r>
-              <a:rPr lang="en-US" sz="1200" b="1" err="1"/>
-              <a:t>ldap</a:t>
-            </a:r>
-            <a:r>
-              <a:rPr lang="en-US" sz="1200" b="1"/>
-              <a:t>)</a:t>
-            </a:r>
-          </a:p>
+              <a:rPr lang="en-US" sz="1200"/>
+              <a:t>Type: LDAP </a:t>
+            </a:r>
+            <a:r>
+              <a:rPr lang="en-US" sz="1200" err="1"/>
+              <a:t>ou</a:t>
+            </a:r>
+            <a:r>
+              <a:rPr lang="en-US" sz="1200"/>
+              <a:t> LOCAL</a:t>
+            </a:r>
+          </a:p>
+        </p:txBody>
+      </p:sp>
+      <p:sp>
+        <p:nvSpPr>
+          <p:cNvPr id="35" name="ZoneTexte 34">
+            <a:extLst>
+              <a:ext uri="{FF2B5EF4-FFF2-40B4-BE49-F238E27FC236}">
+                <a16:creationId xmlns:a16="http://schemas.microsoft.com/office/drawing/2014/main" id="{95C199CC-9C12-F649-8F07-0BC0BA5DFD51}"/>
+              </a:ext>
+            </a:extLst>
+          </p:cNvPr>
+          <p:cNvSpPr txBox="1"/>
+          <p:nvPr/>
+        </p:nvSpPr>
+        <p:spPr>
+          <a:xfrm>
+            <a:off x="8057328" y="2709333"/>
+            <a:ext cx="2059855" cy="830997"/>
+          </a:xfrm>
+          <a:prstGeom prst="rect">
+            <a:avLst/>
+          </a:prstGeom>
+          <a:noFill/>
+        </p:spPr>
+        <p:txBody>
+          <a:bodyPr wrap="square" rtlCol="0">
+            <a:spAutoFit/>
+          </a:bodyPr>
+          <a:lstStyle/>
           <a:p>
             <a:pPr marL="285750" indent="-285750">
               <a:buFont typeface="Arial" panose="020B0604020202020204" pitchFamily="34" charset="0"/>
               <a:buChar char="•"/>
             </a:pPr>
             <a:r>
-              <a:rPr lang="en-US" sz="1200"/>
-              <a:t>Name</a:t>
+              <a:rPr lang="en-US" sz="1200" dirty="0"/>
+              <a:t>Type: ADMIN, READER, WRITER, RUNNER</a:t>
             </a:r>
           </a:p>
           <a:p>
@@ -8024,57 +8061,189 @@
               <a:buChar char="•"/>
             </a:pPr>
             <a:r>
-              <a:rPr lang="en-US" sz="1200"/>
-              <a:t>Type: LDAP </a:t>
-            </a:r>
-            <a:r>
-              <a:rPr lang="en-US" sz="1200" err="1"/>
-              <a:t>ou</a:t>
-            </a:r>
-            <a:r>
-              <a:rPr lang="en-US" sz="1200"/>
-              <a:t> LOCAL</a:t>
-            </a:r>
-          </a:p>
-        </p:txBody>
-      </p:sp>
-      <p:sp>
-        <p:nvSpPr>
-          <p:cNvPr id="35" name="ZoneTexte 34">
-            <a:extLst>
-              <a:ext uri="{FF2B5EF4-FFF2-40B4-BE49-F238E27FC236}">
-                <a16:creationId xmlns:a16="http://schemas.microsoft.com/office/drawing/2014/main" id="{95C199CC-9C12-F649-8F07-0BC0BA5DFD51}"/>
-              </a:ext>
-            </a:extLst>
-          </p:cNvPr>
-          <p:cNvSpPr txBox="1"/>
-          <p:nvPr/>
-        </p:nvSpPr>
-        <p:spPr>
-          <a:xfrm>
-            <a:off x="5667811" y="2709333"/>
-            <a:ext cx="2059855" cy="830997"/>
-          </a:xfrm>
-          <a:prstGeom prst="rect">
-            <a:avLst/>
-          </a:prstGeom>
-          <a:noFill/>
-        </p:spPr>
-        <p:txBody>
-          <a:bodyPr wrap="square" rtlCol="0">
-            <a:spAutoFit/>
-          </a:bodyPr>
-          <a:lstStyle/>
+              <a:rPr lang="en-US" sz="1200" b="1" dirty="0"/>
+              <a:t>Identity</a:t>
+            </a:r>
+          </a:p>
           <a:p>
             <a:pPr marL="285750" indent="-285750">
               <a:buFont typeface="Arial" panose="020B0604020202020204" pitchFamily="34" charset="0"/>
               <a:buChar char="•"/>
             </a:pPr>
             <a:r>
-              <a:rPr lang="en-US" sz="1200"/>
-              <a:t>Type: ADMIN, READER, WRITER, RUNNER</a:t>
-            </a:r>
-          </a:p>
+              <a:rPr lang="en-US" sz="1200" b="1" dirty="0"/>
+              <a:t>group</a:t>
+            </a:r>
+          </a:p>
+        </p:txBody>
+      </p:sp>
+      <p:sp>
+        <p:nvSpPr>
+          <p:cNvPr id="5" name="ZoneTexte 4">
+            <a:extLst>
+              <a:ext uri="{FF2B5EF4-FFF2-40B4-BE49-F238E27FC236}">
+                <a16:creationId xmlns:a16="http://schemas.microsoft.com/office/drawing/2014/main" id="{432F584D-5C78-6C43-9B21-44BAC122FF2F}"/>
+              </a:ext>
+            </a:extLst>
+          </p:cNvPr>
+          <p:cNvSpPr txBox="1"/>
+          <p:nvPr/>
+        </p:nvSpPr>
+        <p:spPr>
+          <a:xfrm>
+            <a:off x="1005703" y="4054962"/>
+            <a:ext cx="6917266" cy="923330"/>
+          </a:xfrm>
+          <a:prstGeom prst="rect">
+            <a:avLst/>
+          </a:prstGeom>
+          <a:noFill/>
+        </p:spPr>
+        <p:txBody>
+          <a:bodyPr wrap="square" rtlCol="0">
+            <a:spAutoFit/>
+          </a:bodyPr>
+          <a:lstStyle/>
+          <a:p>
+            <a:r>
+              <a:rPr lang="en-US"/>
+              <a:t>Role(type=ADMIN, user=</a:t>
+            </a:r>
+            <a:r>
+              <a:rPr lang="en-US" err="1"/>
+              <a:t>alice</a:t>
+            </a:r>
+            <a:r>
+              <a:rPr lang="en-US"/>
+              <a:t>, group=admin) : admin du server</a:t>
+            </a:r>
+          </a:p>
+          <a:p>
+            <a:r>
+              <a:rPr lang="en-US"/>
+              <a:t>Role(type=ADMIN, user=</a:t>
+            </a:r>
+            <a:r>
+              <a:rPr lang="en-US" err="1"/>
+              <a:t>alice</a:t>
+            </a:r>
+            <a:r>
+              <a:rPr lang="en-US"/>
+              <a:t>, group=</a:t>
+            </a:r>
+            <a:r>
+              <a:rPr lang="en-US" err="1"/>
+              <a:t>diese</a:t>
+            </a:r>
+            <a:r>
+              <a:rPr lang="en-US"/>
+              <a:t>) : admin de </a:t>
+            </a:r>
+            <a:r>
+              <a:rPr lang="en-US" err="1"/>
+              <a:t>diese</a:t>
+            </a:r>
+            <a:endParaRPr lang="en-US"/>
+          </a:p>
+          <a:p>
+            <a:r>
+              <a:rPr lang="en-US"/>
+              <a:t>Role(type=WRITER, user=</a:t>
+            </a:r>
+            <a:r>
+              <a:rPr lang="en-US" err="1"/>
+              <a:t>alice</a:t>
+            </a:r>
+            <a:r>
+              <a:rPr lang="en-US"/>
+              <a:t>, group=</a:t>
+            </a:r>
+            <a:r>
+              <a:rPr lang="en-US" err="1"/>
+              <a:t>diese</a:t>
+            </a:r>
+            <a:r>
+              <a:rPr lang="en-US"/>
+              <a:t>) : droit </a:t>
+            </a:r>
+            <a:r>
+              <a:rPr lang="en-US" err="1"/>
+              <a:t>d’édition</a:t>
+            </a:r>
+            <a:r>
+              <a:rPr lang="en-US"/>
+              <a:t> de </a:t>
+            </a:r>
+            <a:r>
+              <a:rPr lang="en-US" err="1"/>
+              <a:t>diese</a:t>
+            </a:r>
+            <a:endParaRPr lang="en-US"/>
+          </a:p>
+        </p:txBody>
+      </p:sp>
+      <p:sp>
+        <p:nvSpPr>
+          <p:cNvPr id="42" name="ZoneTexte 41">
+            <a:extLst>
+              <a:ext uri="{FF2B5EF4-FFF2-40B4-BE49-F238E27FC236}">
+                <a16:creationId xmlns:a16="http://schemas.microsoft.com/office/drawing/2014/main" id="{8FA5E253-A0F4-6949-BA5B-B162001B53DF}"/>
+              </a:ext>
+            </a:extLst>
+          </p:cNvPr>
+          <p:cNvSpPr txBox="1"/>
+          <p:nvPr/>
+        </p:nvSpPr>
+        <p:spPr>
+          <a:xfrm>
+            <a:off x="997291" y="5285035"/>
+            <a:ext cx="6917266" cy="369332"/>
+          </a:xfrm>
+          <a:prstGeom prst="rect">
+            <a:avLst/>
+          </a:prstGeom>
+          <a:noFill/>
+        </p:spPr>
+        <p:txBody>
+          <a:bodyPr wrap="square" rtlCol="0">
+            <a:spAutoFit/>
+          </a:bodyPr>
+          <a:lstStyle/>
+          <a:p>
+            <a:r>
+              <a:rPr lang="en-US"/>
+              <a:t>Hierarchy des roles : READER &lt; WRITER &lt; RUNNER &lt; ADMIN</a:t>
+            </a:r>
+          </a:p>
+        </p:txBody>
+      </p:sp>
+      <p:sp>
+        <p:nvSpPr>
+          <p:cNvPr id="44" name="ZoneTexte 43">
+            <a:extLst>
+              <a:ext uri="{FF2B5EF4-FFF2-40B4-BE49-F238E27FC236}">
+                <a16:creationId xmlns:a16="http://schemas.microsoft.com/office/drawing/2014/main" id="{C3A345AE-82B4-E34C-8E71-9743A7AE717C}"/>
+              </a:ext>
+            </a:extLst>
+          </p:cNvPr>
+          <p:cNvSpPr txBox="1"/>
+          <p:nvPr/>
+        </p:nvSpPr>
+        <p:spPr>
+          <a:xfrm>
+            <a:off x="10405702" y="2755499"/>
+            <a:ext cx="984437" cy="830997"/>
+          </a:xfrm>
+          <a:prstGeom prst="rect">
+            <a:avLst/>
+          </a:prstGeom>
+          <a:noFill/>
+        </p:spPr>
+        <p:txBody>
+          <a:bodyPr wrap="none" rtlCol="0">
+            <a:spAutoFit/>
+          </a:bodyPr>
+          <a:lstStyle/>
           <a:p>
             <a:pPr marL="285750" indent="-285750">
               <a:buFont typeface="Arial" panose="020B0604020202020204" pitchFamily="34" charset="0"/>
@@ -8082,7 +8251,7 @@
             </a:pPr>
             <a:r>
               <a:rPr lang="en-US" sz="1200" b="1"/>
-              <a:t>User</a:t>
+              <a:t>Id study</a:t>
             </a:r>
           </a:p>
           <a:p>
@@ -8091,187 +8260,18 @@
               <a:buChar char="•"/>
             </a:pPr>
             <a:r>
-              <a:rPr lang="en-US" sz="1200" b="1"/>
-              <a:t>group</a:t>
-            </a:r>
-          </a:p>
-        </p:txBody>
-      </p:sp>
-      <p:sp>
-        <p:nvSpPr>
-          <p:cNvPr id="5" name="ZoneTexte 4">
-            <a:extLst>
-              <a:ext uri="{FF2B5EF4-FFF2-40B4-BE49-F238E27FC236}">
-                <a16:creationId xmlns:a16="http://schemas.microsoft.com/office/drawing/2014/main" id="{432F584D-5C78-6C43-9B21-44BAC122FF2F}"/>
-              </a:ext>
-            </a:extLst>
-          </p:cNvPr>
-          <p:cNvSpPr txBox="1"/>
-          <p:nvPr/>
-        </p:nvSpPr>
-        <p:spPr>
-          <a:xfrm>
-            <a:off x="1005703" y="4054962"/>
-            <a:ext cx="6917266" cy="923330"/>
-          </a:xfrm>
-          <a:prstGeom prst="rect">
-            <a:avLst/>
-          </a:prstGeom>
-          <a:noFill/>
-        </p:spPr>
-        <p:txBody>
-          <a:bodyPr wrap="square" rtlCol="0">
-            <a:spAutoFit/>
-          </a:bodyPr>
-          <a:lstStyle/>
-          <a:p>
-            <a:r>
-              <a:rPr lang="en-US"/>
-              <a:t>Role(type=ADMIN, user=</a:t>
-            </a:r>
-            <a:r>
-              <a:rPr lang="en-US" err="1"/>
-              <a:t>alice</a:t>
-            </a:r>
-            <a:r>
-              <a:rPr lang="en-US"/>
-              <a:t>, group=admin) : admin du server</a:t>
-            </a:r>
-          </a:p>
-          <a:p>
-            <a:r>
-              <a:rPr lang="en-US"/>
-              <a:t>Role(type=ADMIN, user=</a:t>
-            </a:r>
-            <a:r>
-              <a:rPr lang="en-US" err="1"/>
-              <a:t>alice</a:t>
-            </a:r>
-            <a:r>
-              <a:rPr lang="en-US"/>
-              <a:t>, group=</a:t>
-            </a:r>
-            <a:r>
-              <a:rPr lang="en-US" err="1"/>
-              <a:t>diese</a:t>
-            </a:r>
-            <a:r>
-              <a:rPr lang="en-US"/>
-              <a:t>) : admin de </a:t>
-            </a:r>
-            <a:r>
-              <a:rPr lang="en-US" err="1"/>
-              <a:t>diese</a:t>
-            </a:r>
-            <a:endParaRPr lang="en-US"/>
-          </a:p>
-          <a:p>
-            <a:r>
-              <a:rPr lang="en-US"/>
-              <a:t>Role(type=WRITER, user=</a:t>
-            </a:r>
-            <a:r>
-              <a:rPr lang="en-US" err="1"/>
-              <a:t>alice</a:t>
-            </a:r>
-            <a:r>
-              <a:rPr lang="en-US"/>
-              <a:t>, group=</a:t>
-            </a:r>
-            <a:r>
-              <a:rPr lang="en-US" err="1"/>
-              <a:t>diese</a:t>
-            </a:r>
-            <a:r>
-              <a:rPr lang="en-US"/>
-              <a:t>) : droit </a:t>
-            </a:r>
-            <a:r>
-              <a:rPr lang="en-US" err="1"/>
-              <a:t>d’édition</a:t>
-            </a:r>
-            <a:r>
-              <a:rPr lang="en-US"/>
-              <a:t> de </a:t>
-            </a:r>
-            <a:r>
-              <a:rPr lang="en-US" err="1"/>
-              <a:t>diese</a:t>
-            </a:r>
-            <a:endParaRPr lang="en-US"/>
-          </a:p>
-        </p:txBody>
-      </p:sp>
-      <p:sp>
-        <p:nvSpPr>
-          <p:cNvPr id="42" name="ZoneTexte 41">
-            <a:extLst>
-              <a:ext uri="{FF2B5EF4-FFF2-40B4-BE49-F238E27FC236}">
-                <a16:creationId xmlns:a16="http://schemas.microsoft.com/office/drawing/2014/main" id="{8FA5E253-A0F4-6949-BA5B-B162001B53DF}"/>
-              </a:ext>
-            </a:extLst>
-          </p:cNvPr>
-          <p:cNvSpPr txBox="1"/>
-          <p:nvPr/>
-        </p:nvSpPr>
-        <p:spPr>
-          <a:xfrm>
-            <a:off x="997291" y="5285035"/>
-            <a:ext cx="6917266" cy="369332"/>
-          </a:xfrm>
-          <a:prstGeom prst="rect">
-            <a:avLst/>
-          </a:prstGeom>
-          <a:noFill/>
-        </p:spPr>
-        <p:txBody>
-          <a:bodyPr wrap="square" rtlCol="0">
-            <a:spAutoFit/>
-          </a:bodyPr>
-          <a:lstStyle/>
-          <a:p>
-            <a:r>
-              <a:rPr lang="en-US"/>
-              <a:t>Hierarchy des roles : READER &lt; WRITER &lt; RUNNER &lt; ADMIN</a:t>
-            </a:r>
-          </a:p>
-        </p:txBody>
-      </p:sp>
-      <p:sp>
-        <p:nvSpPr>
-          <p:cNvPr id="44" name="ZoneTexte 43">
-            <a:extLst>
-              <a:ext uri="{FF2B5EF4-FFF2-40B4-BE49-F238E27FC236}">
-                <a16:creationId xmlns:a16="http://schemas.microsoft.com/office/drawing/2014/main" id="{C3A345AE-82B4-E34C-8E71-9743A7AE717C}"/>
-              </a:ext>
-            </a:extLst>
-          </p:cNvPr>
-          <p:cNvSpPr txBox="1"/>
-          <p:nvPr/>
-        </p:nvSpPr>
-        <p:spPr>
-          <a:xfrm>
-            <a:off x="8016185" y="2755499"/>
-            <a:ext cx="984437" cy="830997"/>
-          </a:xfrm>
-          <a:prstGeom prst="rect">
-            <a:avLst/>
-          </a:prstGeom>
-          <a:noFill/>
-        </p:spPr>
-        <p:txBody>
-          <a:bodyPr wrap="none" rtlCol="0">
-            <a:spAutoFit/>
-          </a:bodyPr>
-          <a:lstStyle/>
+              <a:rPr lang="en-US" sz="1200"/>
+              <a:t>Owner</a:t>
+            </a:r>
+          </a:p>
           <a:p>
             <a:pPr marL="285750" indent="-285750">
               <a:buFont typeface="Arial" panose="020B0604020202020204" pitchFamily="34" charset="0"/>
               <a:buChar char="•"/>
             </a:pPr>
             <a:r>
-              <a:rPr lang="en-US" sz="1200" b="1"/>
-              <a:t>Id study</a:t>
+              <a:rPr lang="en-US" sz="1200"/>
+              <a:t>Groups</a:t>
             </a:r>
           </a:p>
           <a:p>
@@ -8281,26 +8281,6 @@
             </a:pPr>
             <a:r>
               <a:rPr lang="en-US" sz="1200"/>
-              <a:t>Owner</a:t>
-            </a:r>
-          </a:p>
-          <a:p>
-            <a:pPr marL="285750" indent="-285750">
-              <a:buFont typeface="Arial" panose="020B0604020202020204" pitchFamily="34" charset="0"/>
-              <a:buChar char="•"/>
-            </a:pPr>
-            <a:r>
-              <a:rPr lang="en-US" sz="1200"/>
-              <a:t>Groups</a:t>
-            </a:r>
-          </a:p>
-          <a:p>
-            <a:pPr marL="285750" indent="-285750">
-              <a:buFont typeface="Arial" panose="020B0604020202020204" pitchFamily="34" charset="0"/>
-              <a:buChar char="•"/>
-            </a:pPr>
-            <a:r>
-              <a:rPr lang="en-US" sz="1200"/>
               <a:t>public</a:t>
             </a:r>
           </a:p>
@@ -8320,7 +8300,7 @@
         </p:nvSpPr>
         <p:spPr>
           <a:xfrm>
-            <a:off x="5667811" y="3124831"/>
+            <a:off x="8057328" y="3124831"/>
             <a:ext cx="45719" cy="415499"/>
           </a:xfrm>
           <a:prstGeom prst="leftBrace">
@@ -8365,7 +8345,7 @@
         </p:nvSpPr>
         <p:spPr>
           <a:xfrm>
-            <a:off x="5252474" y="3124831"/>
+            <a:off x="7641991" y="3124831"/>
             <a:ext cx="359394" cy="369332"/>
           </a:xfrm>
           <a:prstGeom prst="rect">
@@ -8386,6 +8366,314 @@
           </a:p>
         </p:txBody>
       </p:sp>
+      <p:sp>
+        <p:nvSpPr>
+          <p:cNvPr id="15" name="Rectangle 14">
+            <a:extLst>
+              <a:ext uri="{FF2B5EF4-FFF2-40B4-BE49-F238E27FC236}">
+                <a16:creationId xmlns:a16="http://schemas.microsoft.com/office/drawing/2014/main" id="{67A27E84-7D11-D048-9DC8-523748291CE6}"/>
+              </a:ext>
+            </a:extLst>
+          </p:cNvPr>
+          <p:cNvSpPr/>
+          <p:nvPr/>
+        </p:nvSpPr>
+        <p:spPr>
+          <a:xfrm>
+            <a:off x="5649377" y="2143619"/>
+            <a:ext cx="1403133" cy="420414"/>
+          </a:xfrm>
+          <a:prstGeom prst="rect">
+            <a:avLst/>
+          </a:prstGeom>
+          <a:noFill/>
+          <a:ln w="9525" cap="flat" cmpd="sng" algn="ctr">
+            <a:solidFill>
+              <a:schemeClr val="accent1"/>
+            </a:solidFill>
+            <a:prstDash val="solid"/>
+            <a:round/>
+            <a:headEnd type="none" w="med" len="med"/>
+            <a:tailEnd type="none" w="med" len="med"/>
+          </a:ln>
+        </p:spPr>
+        <p:style>
+          <a:lnRef idx="0">
+            <a:scrgbClr r="0" g="0" b="0"/>
+          </a:lnRef>
+          <a:fillRef idx="0">
+            <a:scrgbClr r="0" g="0" b="0"/>
+          </a:fillRef>
+          <a:effectRef idx="0">
+            <a:scrgbClr r="0" g="0" b="0"/>
+          </a:effectRef>
+          <a:fontRef idx="minor">
+            <a:schemeClr val="accent1"/>
+          </a:fontRef>
+        </p:style>
+        <p:txBody>
+          <a:bodyPr rtlCol="0" anchor="ctr"/>
+          <a:lstStyle/>
+          <a:p>
+            <a:pPr algn="ctr"/>
+            <a:r>
+              <a:rPr lang="en-US" dirty="0"/>
+              <a:t>bot</a:t>
+            </a:r>
+          </a:p>
+        </p:txBody>
+      </p:sp>
+      <p:sp>
+        <p:nvSpPr>
+          <p:cNvPr id="16" name="ZoneTexte 15">
+            <a:extLst>
+              <a:ext uri="{FF2B5EF4-FFF2-40B4-BE49-F238E27FC236}">
+                <a16:creationId xmlns:a16="http://schemas.microsoft.com/office/drawing/2014/main" id="{527B2712-C055-6C4E-B397-0E8AD494F977}"/>
+              </a:ext>
+            </a:extLst>
+          </p:cNvPr>
+          <p:cNvSpPr txBox="1"/>
+          <p:nvPr/>
+        </p:nvSpPr>
+        <p:spPr>
+          <a:xfrm>
+            <a:off x="5649377" y="2709333"/>
+            <a:ext cx="1318887" cy="461665"/>
+          </a:xfrm>
+          <a:prstGeom prst="rect">
+            <a:avLst/>
+          </a:prstGeom>
+          <a:noFill/>
+        </p:spPr>
+        <p:txBody>
+          <a:bodyPr wrap="none" rtlCol="0">
+            <a:spAutoFit/>
+          </a:bodyPr>
+          <a:lstStyle/>
+          <a:p>
+            <a:pPr marL="285750" indent="-285750">
+              <a:buFont typeface="Arial" panose="020B0604020202020204" pitchFamily="34" charset="0"/>
+              <a:buChar char="•"/>
+            </a:pPr>
+            <a:r>
+              <a:rPr lang="en-US" sz="1200" dirty="0"/>
+              <a:t>Owner</a:t>
+            </a:r>
+          </a:p>
+          <a:p>
+            <a:pPr marL="285750" indent="-285750">
+              <a:buFont typeface="Arial" panose="020B0604020202020204" pitchFamily="34" charset="0"/>
+              <a:buChar char="•"/>
+            </a:pPr>
+            <a:r>
+              <a:rPr lang="en-US" sz="1200" dirty="0"/>
+              <a:t>impersonator</a:t>
+            </a:r>
+          </a:p>
+        </p:txBody>
+      </p:sp>
+      <p:sp>
+        <p:nvSpPr>
+          <p:cNvPr id="17" name="Rectangle 16">
+            <a:extLst>
+              <a:ext uri="{FF2B5EF4-FFF2-40B4-BE49-F238E27FC236}">
+                <a16:creationId xmlns:a16="http://schemas.microsoft.com/office/drawing/2014/main" id="{A093FE5F-EB5E-8A40-A7D5-BAF2E3E47D8C}"/>
+              </a:ext>
+            </a:extLst>
+          </p:cNvPr>
+          <p:cNvSpPr/>
+          <p:nvPr/>
+        </p:nvSpPr>
+        <p:spPr>
+          <a:xfrm>
+            <a:off x="4464336" y="556075"/>
+            <a:ext cx="1403133" cy="420414"/>
+          </a:xfrm>
+          <a:prstGeom prst="rect">
+            <a:avLst/>
+          </a:prstGeom>
+          <a:noFill/>
+          <a:ln w="9525" cap="flat" cmpd="sng" algn="ctr">
+            <a:solidFill>
+              <a:schemeClr val="accent1"/>
+            </a:solidFill>
+            <a:prstDash val="solid"/>
+            <a:round/>
+            <a:headEnd type="none" w="med" len="med"/>
+            <a:tailEnd type="none" w="med" len="med"/>
+          </a:ln>
+        </p:spPr>
+        <p:style>
+          <a:lnRef idx="0">
+            <a:scrgbClr r="0" g="0" b="0"/>
+          </a:lnRef>
+          <a:fillRef idx="0">
+            <a:scrgbClr r="0" g="0" b="0"/>
+          </a:fillRef>
+          <a:effectRef idx="0">
+            <a:scrgbClr r="0" g="0" b="0"/>
+          </a:effectRef>
+          <a:fontRef idx="minor">
+            <a:schemeClr val="accent1"/>
+          </a:fontRef>
+        </p:style>
+        <p:txBody>
+          <a:bodyPr rtlCol="0" anchor="ctr"/>
+          <a:lstStyle/>
+          <a:p>
+            <a:pPr algn="ctr"/>
+            <a:r>
+              <a:rPr lang="en-US" dirty="0"/>
+              <a:t>Identity</a:t>
+            </a:r>
+          </a:p>
+        </p:txBody>
+      </p:sp>
+      <p:sp>
+        <p:nvSpPr>
+          <p:cNvPr id="18" name="ZoneTexte 17">
+            <a:extLst>
+              <a:ext uri="{FF2B5EF4-FFF2-40B4-BE49-F238E27FC236}">
+                <a16:creationId xmlns:a16="http://schemas.microsoft.com/office/drawing/2014/main" id="{FD6C21A4-2EB3-BC43-BF85-791B88760FDF}"/>
+              </a:ext>
+            </a:extLst>
+          </p:cNvPr>
+          <p:cNvSpPr txBox="1"/>
+          <p:nvPr/>
+        </p:nvSpPr>
+        <p:spPr>
+          <a:xfrm>
+            <a:off x="4464336" y="1097766"/>
+            <a:ext cx="1117614" cy="646331"/>
+          </a:xfrm>
+          <a:prstGeom prst="rect">
+            <a:avLst/>
+          </a:prstGeom>
+          <a:noFill/>
+        </p:spPr>
+        <p:txBody>
+          <a:bodyPr wrap="none" rtlCol="0">
+            <a:spAutoFit/>
+          </a:bodyPr>
+          <a:lstStyle/>
+          <a:p>
+            <a:pPr marL="285750" indent="-285750">
+              <a:buFont typeface="Arial" panose="020B0604020202020204" pitchFamily="34" charset="0"/>
+              <a:buChar char="•"/>
+            </a:pPr>
+            <a:r>
+              <a:rPr lang="en-US" sz="1200" b="1" dirty="0"/>
+              <a:t>Id</a:t>
+            </a:r>
+          </a:p>
+          <a:p>
+            <a:pPr marL="285750" indent="-285750">
+              <a:buFont typeface="Arial" panose="020B0604020202020204" pitchFamily="34" charset="0"/>
+              <a:buChar char="•"/>
+            </a:pPr>
+            <a:r>
+              <a:rPr lang="en-US" sz="1200" dirty="0"/>
+              <a:t>Username</a:t>
+            </a:r>
+          </a:p>
+          <a:p>
+            <a:pPr marL="285750" indent="-285750">
+              <a:buFont typeface="Arial" panose="020B0604020202020204" pitchFamily="34" charset="0"/>
+              <a:buChar char="•"/>
+            </a:pPr>
+            <a:r>
+              <a:rPr lang="en-US" sz="1200" dirty="0"/>
+              <a:t>type</a:t>
+            </a:r>
+          </a:p>
+        </p:txBody>
+      </p:sp>
+      <p:cxnSp>
+        <p:nvCxnSpPr>
+          <p:cNvPr id="8" name="Connecteur en angle 7">
+            <a:extLst>
+              <a:ext uri="{FF2B5EF4-FFF2-40B4-BE49-F238E27FC236}">
+                <a16:creationId xmlns:a16="http://schemas.microsoft.com/office/drawing/2014/main" id="{F5F0B5B8-3C40-1E48-9798-D6D90136C3AC}"/>
+              </a:ext>
+            </a:extLst>
+          </p:cNvPr>
+          <p:cNvCxnSpPr>
+            <a:cxnSpLocks/>
+            <a:stCxn id="25" idx="0"/>
+            <a:endCxn id="17" idx="1"/>
+          </p:cNvCxnSpPr>
+          <p:nvPr/>
+        </p:nvCxnSpPr>
+        <p:spPr>
+          <a:xfrm rot="5400000" flipH="1" flipV="1">
+            <a:off x="3555632" y="1258939"/>
+            <a:ext cx="1401360" cy="416047"/>
+          </a:xfrm>
+          <a:prstGeom prst="bentConnector2">
+            <a:avLst/>
+          </a:prstGeom>
+          <a:ln>
+            <a:tailEnd type="triangle"/>
+          </a:ln>
+        </p:spPr>
+        <p:style>
+          <a:lnRef idx="1">
+            <a:schemeClr val="accent1"/>
+          </a:lnRef>
+          <a:fillRef idx="0">
+            <a:schemeClr val="accent1"/>
+          </a:fillRef>
+          <a:effectRef idx="0">
+            <a:schemeClr val="accent1"/>
+          </a:effectRef>
+          <a:fontRef idx="minor">
+            <a:schemeClr val="tx1"/>
+          </a:fontRef>
+        </p:style>
+      </p:cxnSp>
+      <p:cxnSp>
+        <p:nvCxnSpPr>
+          <p:cNvPr id="22" name="Connecteur en angle 21">
+            <a:extLst>
+              <a:ext uri="{FF2B5EF4-FFF2-40B4-BE49-F238E27FC236}">
+                <a16:creationId xmlns:a16="http://schemas.microsoft.com/office/drawing/2014/main" id="{91732A5A-958E-984B-B823-FA6D1413A02D}"/>
+              </a:ext>
+            </a:extLst>
+          </p:cNvPr>
+          <p:cNvCxnSpPr>
+            <a:cxnSpLocks/>
+            <a:stCxn id="15" idx="0"/>
+            <a:endCxn id="17" idx="3"/>
+          </p:cNvCxnSpPr>
+          <p:nvPr/>
+        </p:nvCxnSpPr>
+        <p:spPr>
+          <a:xfrm rot="16200000" flipV="1">
+            <a:off x="5420539" y="1213213"/>
+            <a:ext cx="1377337" cy="483475"/>
+          </a:xfrm>
+          <a:prstGeom prst="bentConnector2">
+            <a:avLst/>
+          </a:prstGeom>
+          <a:ln>
+            <a:tailEnd type="triangle"/>
+          </a:ln>
+        </p:spPr>
+        <p:style>
+          <a:lnRef idx="1">
+            <a:schemeClr val="accent1"/>
+          </a:lnRef>
+          <a:fillRef idx="0">
+            <a:schemeClr val="accent1"/>
+          </a:fillRef>
+          <a:effectRef idx="0">
+            <a:schemeClr val="accent1"/>
+          </a:effectRef>
+          <a:fontRef idx="minor">
+            <a:schemeClr val="tx1"/>
+          </a:fontRef>
+        </p:style>
+      </p:cxnSp>
     </p:spTree>
     <p:extLst>
       <p:ext uri="{BB962C8B-B14F-4D97-AF65-F5344CB8AC3E}">
@@ -8438,7 +8726,7 @@
           <a:lstStyle/>
           <a:p>
             <a:r>
-              <a:rPr lang="en-US"/>
+              <a:rPr lang="en-US" dirty="0"/>
               <a:t>login</a:t>
             </a:r>
           </a:p>
@@ -8458,7 +8746,7 @@
         </p:nvCxnSpPr>
         <p:spPr>
           <a:xfrm>
-            <a:off x="1397876" y="2511973"/>
+            <a:off x="354079" y="2421559"/>
             <a:ext cx="0" cy="3100552"/>
           </a:xfrm>
           <a:prstGeom prst="line">
@@ -8495,8 +8783,8 @@
         </p:nvSpPr>
         <p:spPr>
           <a:xfrm>
-            <a:off x="1101961" y="2049517"/>
-            <a:ext cx="591829" cy="369332"/>
+            <a:off x="150737" y="2020871"/>
+            <a:ext cx="617477" cy="369332"/>
           </a:xfrm>
           <a:prstGeom prst="rect">
             <a:avLst/>
@@ -8511,8 +8799,8 @@
           <a:p>
             <a:pPr algn="ctr"/>
             <a:r>
-              <a:rPr lang="en-US"/>
-              <a:t>user</a:t>
+              <a:rPr lang="en-US" dirty="0"/>
+              <a:t>User</a:t>
             </a:r>
           </a:p>
         </p:txBody>
@@ -8680,8 +8968,8 @@
         </p:nvCxnSpPr>
         <p:spPr>
           <a:xfrm>
-            <a:off x="1397876" y="3026979"/>
-            <a:ext cx="2809512" cy="0"/>
+            <a:off x="354079" y="3026979"/>
+            <a:ext cx="3853309" cy="0"/>
           </a:xfrm>
           <a:prstGeom prst="straightConnector1">
             <a:avLst/>
@@ -8803,8 +9091,8 @@
         </p:nvCxnSpPr>
         <p:spPr>
           <a:xfrm flipH="1">
-            <a:off x="1397877" y="4572000"/>
-            <a:ext cx="2809511" cy="0"/>
+            <a:off x="354079" y="5037827"/>
+            <a:ext cx="3853308" cy="0"/>
           </a:xfrm>
           <a:prstGeom prst="straightConnector1">
             <a:avLst/>
@@ -9065,6 +9353,200 @@
           </a:prstGeom>
         </p:spPr>
       </p:pic>
+      <p:sp>
+        <p:nvSpPr>
+          <p:cNvPr id="3" name="ZoneTexte 2">
+            <a:extLst>
+              <a:ext uri="{FF2B5EF4-FFF2-40B4-BE49-F238E27FC236}">
+                <a16:creationId xmlns:a16="http://schemas.microsoft.com/office/drawing/2014/main" id="{6A1E6CB8-C6CD-3242-855A-20126B3F440A}"/>
+              </a:ext>
+            </a:extLst>
+          </p:cNvPr>
+          <p:cNvSpPr txBox="1"/>
+          <p:nvPr/>
+        </p:nvSpPr>
+        <p:spPr>
+          <a:xfrm>
+            <a:off x="459476" y="3297157"/>
+            <a:ext cx="1393330" cy="1200329"/>
+          </a:xfrm>
+          <a:prstGeom prst="rect">
+            <a:avLst/>
+          </a:prstGeom>
+          <a:noFill/>
+        </p:spPr>
+        <p:txBody>
+          <a:bodyPr wrap="none" rtlCol="0">
+            <a:spAutoFit/>
+          </a:bodyPr>
+          <a:lstStyle/>
+          <a:p>
+            <a:r>
+              <a:rPr lang="en-US" sz="1200" dirty="0" err="1">
+                <a:latin typeface="Courier" pitchFamily="2" charset="0"/>
+              </a:rPr>
+              <a:t>UserDTO</a:t>
+            </a:r>
+            <a:r>
+              <a:rPr lang="en-US" sz="1200" dirty="0">
+                <a:latin typeface="Courier" pitchFamily="2" charset="0"/>
+              </a:rPr>
+              <a:t> {</a:t>
+            </a:r>
+          </a:p>
+          <a:p>
+            <a:r>
+              <a:rPr lang="en-US" sz="1200" dirty="0">
+                <a:latin typeface="Courier" pitchFamily="2" charset="0"/>
+              </a:rPr>
+              <a:t>    Username</a:t>
+            </a:r>
+          </a:p>
+          <a:p>
+            <a:r>
+              <a:rPr lang="en-US" sz="1200" dirty="0">
+                <a:latin typeface="Courier" pitchFamily="2" charset="0"/>
+              </a:rPr>
+              <a:t>    Password</a:t>
+            </a:r>
+          </a:p>
+          <a:p>
+            <a:r>
+              <a:rPr lang="en-US" sz="1200" dirty="0">
+                <a:latin typeface="Courier" pitchFamily="2" charset="0"/>
+              </a:rPr>
+              <a:t>}</a:t>
+            </a:r>
+          </a:p>
+          <a:p>
+            <a:endParaRPr lang="en-US" sz="1200" dirty="0">
+              <a:latin typeface="Courier" pitchFamily="2" charset="0"/>
+            </a:endParaRPr>
+          </a:p>
+          <a:p>
+            <a:r>
+              <a:rPr lang="en-US" sz="1200" dirty="0">
+                <a:latin typeface="Courier" pitchFamily="2" charset="0"/>
+              </a:rPr>
+              <a:t>Return </a:t>
+            </a:r>
+            <a:r>
+              <a:rPr lang="en-US" sz="1200" dirty="0" err="1">
+                <a:latin typeface="Courier" pitchFamily="2" charset="0"/>
+              </a:rPr>
+              <a:t>UserId</a:t>
+            </a:r>
+            <a:endParaRPr lang="en-US" sz="1200" dirty="0">
+              <a:latin typeface="Courier" pitchFamily="2" charset="0"/>
+            </a:endParaRPr>
+          </a:p>
+        </p:txBody>
+      </p:sp>
+      <p:sp>
+        <p:nvSpPr>
+          <p:cNvPr id="21" name="ZoneTexte 20">
+            <a:extLst>
+              <a:ext uri="{FF2B5EF4-FFF2-40B4-BE49-F238E27FC236}">
+                <a16:creationId xmlns:a16="http://schemas.microsoft.com/office/drawing/2014/main" id="{111C1983-4456-484B-989E-F71D2857D71D}"/>
+              </a:ext>
+            </a:extLst>
+          </p:cNvPr>
+          <p:cNvSpPr txBox="1"/>
+          <p:nvPr/>
+        </p:nvSpPr>
+        <p:spPr>
+          <a:xfrm>
+            <a:off x="2280733" y="3297157"/>
+            <a:ext cx="1579278" cy="1569660"/>
+          </a:xfrm>
+          <a:prstGeom prst="rect">
+            <a:avLst/>
+          </a:prstGeom>
+          <a:noFill/>
+        </p:spPr>
+        <p:txBody>
+          <a:bodyPr wrap="none" rtlCol="0">
+            <a:spAutoFit/>
+          </a:bodyPr>
+          <a:lstStyle/>
+          <a:p>
+            <a:r>
+              <a:rPr lang="en-US" sz="1200" dirty="0" err="1">
+                <a:latin typeface="Courier" pitchFamily="2" charset="0"/>
+              </a:rPr>
+              <a:t>BotDTO</a:t>
+            </a:r>
+            <a:r>
+              <a:rPr lang="en-US" sz="1200" dirty="0">
+                <a:latin typeface="Courier" pitchFamily="2" charset="0"/>
+              </a:rPr>
+              <a:t> {</a:t>
+            </a:r>
+          </a:p>
+          <a:p>
+            <a:r>
+              <a:rPr lang="en-US" sz="1200" dirty="0">
+                <a:latin typeface="Courier" pitchFamily="2" charset="0"/>
+              </a:rPr>
+              <a:t>    </a:t>
+            </a:r>
+            <a:r>
+              <a:rPr lang="en-US" sz="1200" dirty="0" err="1">
+                <a:latin typeface="Courier" pitchFamily="2" charset="0"/>
+              </a:rPr>
+              <a:t>botname</a:t>
+            </a:r>
+            <a:endParaRPr lang="en-US" sz="1200" dirty="0">
+              <a:latin typeface="Courier" pitchFamily="2" charset="0"/>
+            </a:endParaRPr>
+          </a:p>
+          <a:p>
+            <a:r>
+              <a:rPr lang="en-US" sz="1200" dirty="0">
+                <a:latin typeface="Courier" pitchFamily="2" charset="0"/>
+              </a:rPr>
+              <a:t>    group</a:t>
+            </a:r>
+          </a:p>
+          <a:p>
+            <a:r>
+              <a:rPr lang="en-US" sz="1200" dirty="0">
+                <a:latin typeface="Courier" pitchFamily="2" charset="0"/>
+              </a:rPr>
+              <a:t>    roles</a:t>
+            </a:r>
+          </a:p>
+          <a:p>
+            <a:r>
+              <a:rPr lang="en-US" sz="1200" dirty="0">
+                <a:latin typeface="Courier" pitchFamily="2" charset="0"/>
+              </a:rPr>
+              <a:t>    owner: bool</a:t>
+            </a:r>
+          </a:p>
+          <a:p>
+            <a:r>
+              <a:rPr lang="en-US" sz="1200" dirty="0">
+                <a:latin typeface="Courier" pitchFamily="2" charset="0"/>
+              </a:rPr>
+              <a:t>}</a:t>
+            </a:r>
+          </a:p>
+          <a:p>
+            <a:endParaRPr lang="en-US" sz="1200" dirty="0">
+              <a:latin typeface="Courier" pitchFamily="2" charset="0"/>
+            </a:endParaRPr>
+          </a:p>
+          <a:p>
+            <a:r>
+              <a:rPr lang="en-US" sz="1200" dirty="0">
+                <a:latin typeface="Courier" pitchFamily="2" charset="0"/>
+              </a:rPr>
+              <a:t>Return JWT</a:t>
+            </a:r>
+          </a:p>
+        </p:txBody>
+      </p:sp>
     </p:spTree>
     <p:extLst>
       <p:ext uri="{BB962C8B-B14F-4D97-AF65-F5344CB8AC3E}">
@@ -9174,8 +9656,8 @@
         </p:nvSpPr>
         <p:spPr>
           <a:xfrm>
-            <a:off x="1101961" y="2049517"/>
-            <a:ext cx="591829" cy="369332"/>
+            <a:off x="1089137" y="2049517"/>
+            <a:ext cx="617477" cy="369332"/>
           </a:xfrm>
           <a:prstGeom prst="rect">
             <a:avLst/>
@@ -9190,8 +9672,8 @@
           <a:p>
             <a:pPr algn="ctr"/>
             <a:r>
-              <a:rPr lang="en-US"/>
-              <a:t>user</a:t>
+              <a:rPr lang="en-US" dirty="0"/>
+              <a:t>User</a:t>
             </a:r>
           </a:p>
         </p:txBody>
@@ -10747,14 +11229,14 @@
           <p:nvPr>
             <p:extLst>
               <p:ext uri="{D42A27DB-BD31-4B8C-83A1-F6EECF244321}">
-                <p14:modId xmlns:p14="http://schemas.microsoft.com/office/powerpoint/2010/main" val="2094093077"/>
+                <p14:modId xmlns:p14="http://schemas.microsoft.com/office/powerpoint/2010/main" val="3893566250"/>
               </p:ext>
             </p:extLst>
           </p:nvPr>
         </p:nvGraphicFramePr>
         <p:xfrm>
           <a:off x="539015" y="2338939"/>
-          <a:ext cx="11194180" cy="2984935"/>
+          <a:ext cx="11194180" cy="4366695"/>
         </p:xfrm>
         <a:graphic>
           <a:graphicData uri="http://schemas.openxmlformats.org/drawingml/2006/table">
@@ -10763,14 +11245,14 @@
                 <a:tableStyleId>{C083E6E3-FA7D-4D7B-A595-EF9225AFEA82}</a:tableStyleId>
               </a:tblPr>
               <a:tblGrid>
-                <a:gridCol w="1732547">
+                <a:gridCol w="1755611">
                   <a:extLst>
                     <a:ext uri="{9D8B030D-6E8A-4147-A177-3AD203B41FA5}">
                       <a16:colId xmlns:a16="http://schemas.microsoft.com/office/drawing/2014/main" val="2909901128"/>
                     </a:ext>
                   </a:extLst>
                 </a:gridCol>
-                <a:gridCol w="5730240">
+                <a:gridCol w="5707176">
                   <a:extLst>
                     <a:ext uri="{9D8B030D-6E8A-4147-A177-3AD203B41FA5}">
                       <a16:colId xmlns:a16="http://schemas.microsoft.com/office/drawing/2014/main" val="736002328"/>
@@ -10806,8 +11288,8 @@
                     <a:lstStyle/>
                     <a:p>
                       <a:r>
-                        <a:rPr lang="en-US"/>
-                        <a:t>scope</a:t>
+                        <a:rPr lang="en-US" dirty="0"/>
+                        <a:t>comments</a:t>
                       </a:r>
                     </a:p>
                   </a:txBody>
@@ -10980,7 +11462,54 @@
                     <a:lstStyle/>
                     <a:p>
                       <a:r>
-                        <a:rPr lang="en-US"/>
+                        <a:rPr lang="en-US" dirty="0"/>
+                        <a:t>Create bot</a:t>
+                      </a:r>
+                    </a:p>
+                  </a:txBody>
+                  <a:tcPr/>
+                </a:tc>
+                <a:tc>
+                  <a:txBody>
+                    <a:bodyPr/>
+                    <a:lstStyle/>
+                    <a:p>
+                      <a:r>
+                        <a:rPr lang="en-US" dirty="0"/>
+                        <a:t>Accept only same permission than user</a:t>
+                      </a:r>
+                    </a:p>
+                  </a:txBody>
+                  <a:tcPr/>
+                </a:tc>
+                <a:tc>
+                  <a:txBody>
+                    <a:bodyPr/>
+                    <a:lstStyle/>
+                    <a:p>
+                      <a:r>
+                        <a:rPr lang="en-US" dirty="0" err="1"/>
+                        <a:t>User.Id</a:t>
+                      </a:r>
+                      <a:endParaRPr lang="en-US" dirty="0"/>
+                    </a:p>
+                  </a:txBody>
+                  <a:tcPr/>
+                </a:tc>
+                <a:extLst>
+                  <a:ext uri="{0D108BD9-81ED-4DB2-BD59-A6C34878D82A}">
+                    <a16:rowId xmlns:a16="http://schemas.microsoft.com/office/drawing/2014/main" val="1905986350"/>
+                  </a:ext>
+                </a:extLst>
+              </a:tr>
+              <a:tr h="370840">
+                <a:tc>
+                  <a:txBody>
+                    <a:bodyPr/>
+                    <a:lstStyle/>
+                    <a:p>
+                      <a:r>
+                        <a:rPr lang="en-US" dirty="0"/>
                         <a:t>Create user</a:t>
                       </a:r>
                     </a:p>
@@ -10993,7 +11522,7 @@
                     <a:lstStyle/>
                     <a:p>
                       <a:r>
-                        <a:rPr lang="en-US"/>
+                        <a:rPr lang="en-US" dirty="0"/>
                         <a:t>*</a:t>
                       </a:r>
                     </a:p>
@@ -11026,7 +11555,78 @@
                     <a:lstStyle/>
                     <a:p>
                       <a:r>
-                        <a:rPr lang="en-US"/>
+                        <a:rPr lang="en-US" dirty="0"/>
+                        <a:t>Delete bot</a:t>
+                      </a:r>
+                    </a:p>
+                  </a:txBody>
+                  <a:tcPr/>
+                </a:tc>
+                <a:tc>
+                  <a:txBody>
+                    <a:bodyPr/>
+                    <a:lstStyle/>
+                    <a:p>
+                      <a:r>
+                        <a:rPr lang="en-US" dirty="0"/>
+                        <a:t>*</a:t>
+                      </a:r>
+                    </a:p>
+                  </a:txBody>
+                  <a:tcPr/>
+                </a:tc>
+                <a:tc>
+                  <a:txBody>
+                    <a:bodyPr/>
+                    <a:lstStyle/>
+                    <a:p>
+                      <a:pPr marL="0" marR="0" lvl="0" indent="0" algn="l" defTabSz="914400" rtl="0" eaLnBrk="1" fontAlgn="auto" latinLnBrk="0" hangingPunct="1">
+                        <a:lnSpc>
+                          <a:spcPct val="100000"/>
+                        </a:lnSpc>
+                        <a:spcBef>
+                          <a:spcPts val="0"/>
+                        </a:spcBef>
+                        <a:spcAft>
+                          <a:spcPts val="0"/>
+                        </a:spcAft>
+                        <a:buClrTx/>
+                        <a:buSzTx/>
+                        <a:buFontTx/>
+                        <a:buNone/>
+                        <a:tabLst/>
+                        <a:defRPr/>
+                      </a:pPr>
+                      <a:r>
+                        <a:rPr lang="en-US" dirty="0" err="1">
+                          <a:latin typeface="Courier" pitchFamily="2" charset="0"/>
+                        </a:rPr>
+                        <a:t>User.Id</a:t>
+                      </a:r>
+                      <a:r>
+                        <a:rPr lang="en-US" dirty="0">
+                          <a:latin typeface="Courier" pitchFamily="2" charset="0"/>
+                        </a:rPr>
+                        <a:t>, Admin</a:t>
+                      </a:r>
+                    </a:p>
+                  </a:txBody>
+                  <a:tcPr/>
+                </a:tc>
+                <a:extLst>
+                  <a:ext uri="{0D108BD9-81ED-4DB2-BD59-A6C34878D82A}">
+                    <a16:rowId xmlns:a16="http://schemas.microsoft.com/office/drawing/2014/main" val="2822939541"/>
+                  </a:ext>
+                </a:extLst>
+              </a:tr>
+              <a:tr h="370840">
+                <a:tc>
+                  <a:txBody>
+                    <a:bodyPr/>
+                    <a:lstStyle/>
+                    <a:p>
+                      <a:r>
+                        <a:rPr lang="en-US" dirty="0"/>
                         <a:t>Delete user</a:t>
                       </a:r>
                     </a:p>
@@ -11039,8 +11639,8 @@
                     <a:lstStyle/>
                     <a:p>
                       <a:r>
-                        <a:rPr lang="en-US"/>
-                        <a:t>*</a:t>
+                        <a:rPr lang="en-US" dirty="0"/>
+                        <a:t>Delete all bots owned by user</a:t>
                       </a:r>
                     </a:p>
                   </a:txBody>
@@ -11096,6 +11696,70 @@
                     <a:lstStyle/>
                     <a:p>
                       <a:r>
+                        <a:rPr lang="en-US" dirty="0"/>
+                        <a:t>Get bots</a:t>
+                      </a:r>
+                    </a:p>
+                  </a:txBody>
+                  <a:tcPr/>
+                </a:tc>
+                <a:tc>
+                  <a:txBody>
+                    <a:bodyPr/>
+                    <a:lstStyle/>
+                    <a:p>
+                      <a:r>
+                        <a:rPr lang="en-US" dirty="0"/>
+                        <a:t>Only bots owned by user</a:t>
+                      </a:r>
+                    </a:p>
+                  </a:txBody>
+                  <a:tcPr/>
+                </a:tc>
+                <a:tc>
+                  <a:txBody>
+                    <a:bodyPr/>
+                    <a:lstStyle/>
+                    <a:p>
+                      <a:pPr marL="0" marR="0" lvl="0" indent="0" algn="l" defTabSz="914400" rtl="0" eaLnBrk="1" fontAlgn="auto" latinLnBrk="0" hangingPunct="1">
+                        <a:lnSpc>
+                          <a:spcPct val="100000"/>
+                        </a:lnSpc>
+                        <a:spcBef>
+                          <a:spcPts val="0"/>
+                        </a:spcBef>
+                        <a:spcAft>
+                          <a:spcPts val="0"/>
+                        </a:spcAft>
+                        <a:buClrTx/>
+                        <a:buSzTx/>
+                        <a:buFontTx/>
+                        <a:buNone/>
+                        <a:tabLst/>
+                        <a:defRPr/>
+                      </a:pPr>
+                      <a:r>
+                        <a:rPr lang="en-US" dirty="0" err="1"/>
+                        <a:t>User.id</a:t>
+                      </a:r>
+                      <a:endParaRPr lang="en-US" dirty="0"/>
+                    </a:p>
+                  </a:txBody>
+                  <a:tcPr/>
+                </a:tc>
+                <a:extLst>
+                  <a:ext uri="{0D108BD9-81ED-4DB2-BD59-A6C34878D82A}">
+                    <a16:rowId xmlns:a16="http://schemas.microsoft.com/office/drawing/2014/main" val="4147530812"/>
+                  </a:ext>
+                </a:extLst>
+              </a:tr>
+              <a:tr h="370840">
+                <a:tc>
+                  <a:txBody>
+                    <a:bodyPr/>
+                    <a:lstStyle/>
+                    <a:p>
+                      <a:r>
                         <a:rPr lang="en-US"/>
                         <a:t>Get user</a:t>
                       </a:r>
@@ -11109,7 +11773,7 @@
                     <a:lstStyle/>
                     <a:p>
                       <a:r>
-                        <a:rPr lang="en-US"/>
+                        <a:rPr lang="en-US" dirty="0"/>
                         <a:t>*</a:t>
                       </a:r>
                     </a:p>
@@ -11226,8 +11890,8 @@
                     <a:lstStyle/>
                     <a:p>
                       <a:r>
-                        <a:rPr lang="en-US"/>
-                        <a:t>Get all</a:t>
+                        <a:rPr lang="en-US" dirty="0"/>
+                        <a:t>Get all user / bots</a:t>
                       </a:r>
                     </a:p>
                   </a:txBody>
@@ -11252,7 +11916,7 @@
                     <a:lstStyle/>
                     <a:p>
                       <a:r>
-                        <a:rPr lang="en-US"/>
+                        <a:rPr lang="en-US" dirty="0"/>
                         <a:t>ADMIN</a:t>
                       </a:r>
                     </a:p>

</xml_diff>

<commit_message>
Issue 229 setup token api (#310)
* refactor user model to be a child of Identity. Role is linked to Identity.

* setup bot repository

* WIP bot service implementation

* refactor login service with bot

* add bots endpoint

* fix mypy

* refactor JWTUser : remove name, add impersonator and type attributes. Revoke JWT if bot not in database. WIP: refactor study service to use impersonator attributes rather than id.

* use impersonator rather than id as owner identity

* create an hierarchy between roles. refactor create bot acceptance rules.

* refactor BotCreateDTO. add openapi spec
</commit_message>
<xml_diff>
--- a/docs/draft/login.pptx
+++ b/docs/draft/login.pptx
@@ -128,7 +128,7 @@
 <file path=ppt/revisionInfo.xml><?xml version="1.0" encoding="utf-8"?>
 <p1510:revInfo xmlns:a="http://schemas.openxmlformats.org/drawingml/2006/main" xmlns:r="http://schemas.openxmlformats.org/officeDocument/2006/relationships" xmlns:p1510="http://schemas.microsoft.com/office/powerpoint/2015/10/main">
   <p1510:revLst>
-    <p1510:client id="{C60EBF00-23D1-EC43-80FC-D814DB69B47B}" v="909" dt="2021-03-02T16:05:26.869"/>
+    <p1510:client id="{C60EBF00-23D1-EC43-80FC-D814DB69B47B}" v="914" dt="2021-04-15T08:40:12.105"/>
   </p1510:revLst>
 </p1510:revInfo>
 </file>
@@ -282,7 +282,7 @@
           <a:p>
             <a:fld id="{A3602159-DCB3-864E-86CF-84BE81740A90}" type="datetimeFigureOut">
               <a:rPr lang="en-US" smtClean="0"/>
-              <a:t>3/9/21</a:t>
+              <a:t>4/15/21</a:t>
             </a:fld>
             <a:endParaRPr lang="en-US"/>
           </a:p>
@@ -482,7 +482,7 @@
           <a:p>
             <a:fld id="{A3602159-DCB3-864E-86CF-84BE81740A90}" type="datetimeFigureOut">
               <a:rPr lang="en-US" smtClean="0"/>
-              <a:t>3/9/21</a:t>
+              <a:t>4/15/21</a:t>
             </a:fld>
             <a:endParaRPr lang="en-US"/>
           </a:p>
@@ -692,7 +692,7 @@
           <a:p>
             <a:fld id="{A3602159-DCB3-864E-86CF-84BE81740A90}" type="datetimeFigureOut">
               <a:rPr lang="en-US" smtClean="0"/>
-              <a:t>3/9/21</a:t>
+              <a:t>4/15/21</a:t>
             </a:fld>
             <a:endParaRPr lang="en-US"/>
           </a:p>
@@ -892,7 +892,7 @@
           <a:p>
             <a:fld id="{A3602159-DCB3-864E-86CF-84BE81740A90}" type="datetimeFigureOut">
               <a:rPr lang="en-US" smtClean="0"/>
-              <a:t>3/9/21</a:t>
+              <a:t>4/15/21</a:t>
             </a:fld>
             <a:endParaRPr lang="en-US"/>
           </a:p>
@@ -1168,7 +1168,7 @@
           <a:p>
             <a:fld id="{A3602159-DCB3-864E-86CF-84BE81740A90}" type="datetimeFigureOut">
               <a:rPr lang="en-US" smtClean="0"/>
-              <a:t>3/9/21</a:t>
+              <a:t>4/15/21</a:t>
             </a:fld>
             <a:endParaRPr lang="en-US"/>
           </a:p>
@@ -1436,7 +1436,7 @@
           <a:p>
             <a:fld id="{A3602159-DCB3-864E-86CF-84BE81740A90}" type="datetimeFigureOut">
               <a:rPr lang="en-US" smtClean="0"/>
-              <a:t>3/9/21</a:t>
+              <a:t>4/15/21</a:t>
             </a:fld>
             <a:endParaRPr lang="en-US"/>
           </a:p>
@@ -1851,7 +1851,7 @@
           <a:p>
             <a:fld id="{A3602159-DCB3-864E-86CF-84BE81740A90}" type="datetimeFigureOut">
               <a:rPr lang="en-US" smtClean="0"/>
-              <a:t>3/9/21</a:t>
+              <a:t>4/15/21</a:t>
             </a:fld>
             <a:endParaRPr lang="en-US"/>
           </a:p>
@@ -1993,7 +1993,7 @@
           <a:p>
             <a:fld id="{A3602159-DCB3-864E-86CF-84BE81740A90}" type="datetimeFigureOut">
               <a:rPr lang="en-US" smtClean="0"/>
-              <a:t>3/9/21</a:t>
+              <a:t>4/15/21</a:t>
             </a:fld>
             <a:endParaRPr lang="en-US"/>
           </a:p>
@@ -2106,7 +2106,7 @@
           <a:p>
             <a:fld id="{A3602159-DCB3-864E-86CF-84BE81740A90}" type="datetimeFigureOut">
               <a:rPr lang="en-US" smtClean="0"/>
-              <a:t>3/9/21</a:t>
+              <a:t>4/15/21</a:t>
             </a:fld>
             <a:endParaRPr lang="en-US"/>
           </a:p>
@@ -2419,7 +2419,7 @@
           <a:p>
             <a:fld id="{A3602159-DCB3-864E-86CF-84BE81740A90}" type="datetimeFigureOut">
               <a:rPr lang="en-US" smtClean="0"/>
-              <a:t>3/9/21</a:t>
+              <a:t>4/15/21</a:t>
             </a:fld>
             <a:endParaRPr lang="en-US"/>
           </a:p>
@@ -2708,7 +2708,7 @@
           <a:p>
             <a:fld id="{A3602159-DCB3-864E-86CF-84BE81740A90}" type="datetimeFigureOut">
               <a:rPr lang="en-US" smtClean="0"/>
-              <a:t>3/9/21</a:t>
+              <a:t>4/15/21</a:t>
             </a:fld>
             <a:endParaRPr lang="en-US"/>
           </a:p>
@@ -2951,7 +2951,7 @@
           <a:p>
             <a:fld id="{A3602159-DCB3-864E-86CF-84BE81740A90}" type="datetimeFigureOut">
               <a:rPr lang="en-US" smtClean="0"/>
-              <a:t>3/9/21</a:t>
+              <a:t>4/15/21</a:t>
             </a:fld>
             <a:endParaRPr lang="en-US"/>
           </a:p>
@@ -7640,7 +7640,7 @@
           <a:lstStyle/>
           <a:p>
             <a:r>
-              <a:rPr lang="en-US"/>
+              <a:rPr lang="en-US" dirty="0"/>
               <a:t>model</a:t>
             </a:r>
           </a:p>
@@ -7697,7 +7697,7 @@
           <a:p>
             <a:pPr algn="ctr"/>
             <a:r>
-              <a:rPr lang="en-US"/>
+              <a:rPr lang="en-US" dirty="0"/>
               <a:t>user</a:t>
             </a:r>
           </a:p>
@@ -7774,7 +7774,7 @@
         </p:nvSpPr>
         <p:spPr>
           <a:xfrm>
-            <a:off x="5611868" y="2167642"/>
+            <a:off x="8001385" y="2167642"/>
             <a:ext cx="1403133" cy="420414"/>
           </a:xfrm>
           <a:prstGeom prst="rect">
@@ -7831,7 +7831,7 @@
         </p:nvSpPr>
         <p:spPr>
           <a:xfrm>
-            <a:off x="8016185" y="2167642"/>
+            <a:off x="10405702" y="2167642"/>
             <a:ext cx="1403133" cy="420414"/>
           </a:xfrm>
           <a:prstGeom prst="rect">
@@ -7889,7 +7889,7 @@
         <p:spPr>
           <a:xfrm>
             <a:off x="3346722" y="2709333"/>
-            <a:ext cx="1117614" cy="1015663"/>
+            <a:ext cx="1069973" cy="646331"/>
           </a:xfrm>
           <a:prstGeom prst="rect">
             <a:avLst/>
@@ -7907,8 +7907,8 @@
               <a:buChar char="•"/>
             </a:pPr>
             <a:r>
-              <a:rPr lang="en-US" sz="1200" b="1"/>
-              <a:t>Id</a:t>
+              <a:rPr lang="en-US" sz="1200" dirty="0"/>
+              <a:t>Name</a:t>
             </a:r>
           </a:p>
           <a:p>
@@ -7917,9 +7917,10 @@
               <a:buChar char="•"/>
             </a:pPr>
             <a:r>
-              <a:rPr lang="en-US" sz="1200"/>
-              <a:t>Username</a:t>
-            </a:r>
+              <a:rPr lang="en-US" sz="1200" dirty="0" err="1"/>
+              <a:t>firstname</a:t>
+            </a:r>
+            <a:endParaRPr lang="en-US" sz="1200" dirty="0"/>
           </a:p>
           <a:p>
             <a:pPr marL="285750" indent="-285750">
@@ -7927,20 +7928,65 @@
               <a:buChar char="•"/>
             </a:pPr>
             <a:r>
-              <a:rPr lang="en-US" sz="1200"/>
-              <a:t>Name</a:t>
-            </a:r>
-          </a:p>
+              <a:rPr lang="en-US" sz="1200" dirty="0" err="1"/>
+              <a:t>Pwd</a:t>
+            </a:r>
+            <a:endParaRPr lang="en-US" sz="1200" dirty="0"/>
+          </a:p>
+        </p:txBody>
+      </p:sp>
+      <p:sp>
+        <p:nvSpPr>
+          <p:cNvPr id="34" name="ZoneTexte 33">
+            <a:extLst>
+              <a:ext uri="{FF2B5EF4-FFF2-40B4-BE49-F238E27FC236}">
+                <a16:creationId xmlns:a16="http://schemas.microsoft.com/office/drawing/2014/main" id="{0DF32139-2495-064C-8A37-55B68DCBC60B}"/>
+              </a:ext>
+            </a:extLst>
+          </p:cNvPr>
+          <p:cNvSpPr txBox="1"/>
+          <p:nvPr/>
+        </p:nvSpPr>
+        <p:spPr>
+          <a:xfrm>
+            <a:off x="1005703" y="2823272"/>
+            <a:ext cx="1802288" cy="646331"/>
+          </a:xfrm>
+          <a:prstGeom prst="rect">
+            <a:avLst/>
+          </a:prstGeom>
+          <a:noFill/>
+        </p:spPr>
+        <p:txBody>
+          <a:bodyPr wrap="none" rtlCol="0">
+            <a:spAutoFit/>
+          </a:bodyPr>
+          <a:lstStyle/>
           <a:p>
             <a:pPr marL="285750" indent="-285750">
               <a:buFont typeface="Arial" panose="020B0604020202020204" pitchFamily="34" charset="0"/>
               <a:buChar char="•"/>
             </a:pPr>
             <a:r>
-              <a:rPr lang="en-US" sz="1200" err="1"/>
-              <a:t>firstname</a:t>
-            </a:r>
-            <a:endParaRPr lang="en-US" sz="1200"/>
+              <a:rPr lang="en-US" sz="1200" b="1"/>
+              <a:t>Id (</a:t>
+            </a:r>
+            <a:r>
+              <a:rPr lang="en-US" sz="1200" b="1" err="1"/>
+              <a:t>uuid</a:t>
+            </a:r>
+            <a:r>
+              <a:rPr lang="en-US" sz="1200" b="1"/>
+              <a:t> or </a:t>
+            </a:r>
+            <a:r>
+              <a:rPr lang="en-US" sz="1200" b="1" err="1"/>
+              <a:t>ldap</a:t>
+            </a:r>
+            <a:r>
+              <a:rPr lang="en-US" sz="1200" b="1"/>
+              <a:t>)</a:t>
+            </a:r>
           </a:p>
           <a:p>
             <a:pPr marL="285750" indent="-285750">
@@ -7948,74 +7994,65 @@
               <a:buChar char="•"/>
             </a:pPr>
             <a:r>
-              <a:rPr lang="en-US" sz="1200" err="1"/>
-              <a:t>pwd</a:t>
-            </a:r>
-            <a:endParaRPr lang="en-US" sz="1200"/>
-          </a:p>
-        </p:txBody>
-      </p:sp>
-      <p:sp>
-        <p:nvSpPr>
-          <p:cNvPr id="34" name="ZoneTexte 33">
-            <a:extLst>
-              <a:ext uri="{FF2B5EF4-FFF2-40B4-BE49-F238E27FC236}">
-                <a16:creationId xmlns:a16="http://schemas.microsoft.com/office/drawing/2014/main" id="{0DF32139-2495-064C-8A37-55B68DCBC60B}"/>
-              </a:ext>
-            </a:extLst>
-          </p:cNvPr>
-          <p:cNvSpPr txBox="1"/>
-          <p:nvPr/>
-        </p:nvSpPr>
-        <p:spPr>
-          <a:xfrm>
-            <a:off x="1005703" y="2823272"/>
-            <a:ext cx="1802288" cy="646331"/>
-          </a:xfrm>
-          <a:prstGeom prst="rect">
-            <a:avLst/>
-          </a:prstGeom>
-          <a:noFill/>
-        </p:spPr>
-        <p:txBody>
-          <a:bodyPr wrap="none" rtlCol="0">
-            <a:spAutoFit/>
-          </a:bodyPr>
-          <a:lstStyle/>
+              <a:rPr lang="en-US" sz="1200"/>
+              <a:t>Name</a:t>
+            </a:r>
+          </a:p>
           <a:p>
             <a:pPr marL="285750" indent="-285750">
               <a:buFont typeface="Arial" panose="020B0604020202020204" pitchFamily="34" charset="0"/>
               <a:buChar char="•"/>
             </a:pPr>
             <a:r>
-              <a:rPr lang="en-US" sz="1200" b="1"/>
-              <a:t>Id (</a:t>
-            </a:r>
-            <a:r>
-              <a:rPr lang="en-US" sz="1200" b="1" err="1"/>
-              <a:t>uuid</a:t>
-            </a:r>
-            <a:r>
-              <a:rPr lang="en-US" sz="1200" b="1"/>
-              <a:t> or </a:t>
-            </a:r>
-            <a:r>
-              <a:rPr lang="en-US" sz="1200" b="1" err="1"/>
-              <a:t>ldap</a:t>
-            </a:r>
-            <a:r>
-              <a:rPr lang="en-US" sz="1200" b="1"/>
-              <a:t>)</a:t>
-            </a:r>
-          </a:p>
+              <a:rPr lang="en-US" sz="1200"/>
+              <a:t>Type: LDAP </a:t>
+            </a:r>
+            <a:r>
+              <a:rPr lang="en-US" sz="1200" err="1"/>
+              <a:t>ou</a:t>
+            </a:r>
+            <a:r>
+              <a:rPr lang="en-US" sz="1200"/>
+              <a:t> LOCAL</a:t>
+            </a:r>
+          </a:p>
+        </p:txBody>
+      </p:sp>
+      <p:sp>
+        <p:nvSpPr>
+          <p:cNvPr id="35" name="ZoneTexte 34">
+            <a:extLst>
+              <a:ext uri="{FF2B5EF4-FFF2-40B4-BE49-F238E27FC236}">
+                <a16:creationId xmlns:a16="http://schemas.microsoft.com/office/drawing/2014/main" id="{95C199CC-9C12-F649-8F07-0BC0BA5DFD51}"/>
+              </a:ext>
+            </a:extLst>
+          </p:cNvPr>
+          <p:cNvSpPr txBox="1"/>
+          <p:nvPr/>
+        </p:nvSpPr>
+        <p:spPr>
+          <a:xfrm>
+            <a:off x="8057328" y="2709333"/>
+            <a:ext cx="2059855" cy="830997"/>
+          </a:xfrm>
+          <a:prstGeom prst="rect">
+            <a:avLst/>
+          </a:prstGeom>
+          <a:noFill/>
+        </p:spPr>
+        <p:txBody>
+          <a:bodyPr wrap="square" rtlCol="0">
+            <a:spAutoFit/>
+          </a:bodyPr>
+          <a:lstStyle/>
           <a:p>
             <a:pPr marL="285750" indent="-285750">
               <a:buFont typeface="Arial" panose="020B0604020202020204" pitchFamily="34" charset="0"/>
               <a:buChar char="•"/>
             </a:pPr>
             <a:r>
-              <a:rPr lang="en-US" sz="1200"/>
-              <a:t>Name</a:t>
+              <a:rPr lang="en-US" sz="1200" dirty="0"/>
+              <a:t>Type: ADMIN, READER, WRITER, RUNNER</a:t>
             </a:r>
           </a:p>
           <a:p>
@@ -8024,57 +8061,189 @@
               <a:buChar char="•"/>
             </a:pPr>
             <a:r>
-              <a:rPr lang="en-US" sz="1200"/>
-              <a:t>Type: LDAP </a:t>
-            </a:r>
-            <a:r>
-              <a:rPr lang="en-US" sz="1200" err="1"/>
-              <a:t>ou</a:t>
-            </a:r>
-            <a:r>
-              <a:rPr lang="en-US" sz="1200"/>
-              <a:t> LOCAL</a:t>
-            </a:r>
-          </a:p>
-        </p:txBody>
-      </p:sp>
-      <p:sp>
-        <p:nvSpPr>
-          <p:cNvPr id="35" name="ZoneTexte 34">
-            <a:extLst>
-              <a:ext uri="{FF2B5EF4-FFF2-40B4-BE49-F238E27FC236}">
-                <a16:creationId xmlns:a16="http://schemas.microsoft.com/office/drawing/2014/main" id="{95C199CC-9C12-F649-8F07-0BC0BA5DFD51}"/>
-              </a:ext>
-            </a:extLst>
-          </p:cNvPr>
-          <p:cNvSpPr txBox="1"/>
-          <p:nvPr/>
-        </p:nvSpPr>
-        <p:spPr>
-          <a:xfrm>
-            <a:off x="5667811" y="2709333"/>
-            <a:ext cx="2059855" cy="830997"/>
-          </a:xfrm>
-          <a:prstGeom prst="rect">
-            <a:avLst/>
-          </a:prstGeom>
-          <a:noFill/>
-        </p:spPr>
-        <p:txBody>
-          <a:bodyPr wrap="square" rtlCol="0">
-            <a:spAutoFit/>
-          </a:bodyPr>
-          <a:lstStyle/>
+              <a:rPr lang="en-US" sz="1200" b="1" dirty="0"/>
+              <a:t>Identity</a:t>
+            </a:r>
+          </a:p>
           <a:p>
             <a:pPr marL="285750" indent="-285750">
               <a:buFont typeface="Arial" panose="020B0604020202020204" pitchFamily="34" charset="0"/>
               <a:buChar char="•"/>
             </a:pPr>
             <a:r>
-              <a:rPr lang="en-US" sz="1200"/>
-              <a:t>Type: ADMIN, READER, WRITER, RUNNER</a:t>
-            </a:r>
-          </a:p>
+              <a:rPr lang="en-US" sz="1200" b="1" dirty="0"/>
+              <a:t>group</a:t>
+            </a:r>
+          </a:p>
+        </p:txBody>
+      </p:sp>
+      <p:sp>
+        <p:nvSpPr>
+          <p:cNvPr id="5" name="ZoneTexte 4">
+            <a:extLst>
+              <a:ext uri="{FF2B5EF4-FFF2-40B4-BE49-F238E27FC236}">
+                <a16:creationId xmlns:a16="http://schemas.microsoft.com/office/drawing/2014/main" id="{432F584D-5C78-6C43-9B21-44BAC122FF2F}"/>
+              </a:ext>
+            </a:extLst>
+          </p:cNvPr>
+          <p:cNvSpPr txBox="1"/>
+          <p:nvPr/>
+        </p:nvSpPr>
+        <p:spPr>
+          <a:xfrm>
+            <a:off x="1005703" y="4054962"/>
+            <a:ext cx="6917266" cy="923330"/>
+          </a:xfrm>
+          <a:prstGeom prst="rect">
+            <a:avLst/>
+          </a:prstGeom>
+          <a:noFill/>
+        </p:spPr>
+        <p:txBody>
+          <a:bodyPr wrap="square" rtlCol="0">
+            <a:spAutoFit/>
+          </a:bodyPr>
+          <a:lstStyle/>
+          <a:p>
+            <a:r>
+              <a:rPr lang="en-US"/>
+              <a:t>Role(type=ADMIN, user=</a:t>
+            </a:r>
+            <a:r>
+              <a:rPr lang="en-US" err="1"/>
+              <a:t>alice</a:t>
+            </a:r>
+            <a:r>
+              <a:rPr lang="en-US"/>
+              <a:t>, group=admin) : admin du server</a:t>
+            </a:r>
+          </a:p>
+          <a:p>
+            <a:r>
+              <a:rPr lang="en-US"/>
+              <a:t>Role(type=ADMIN, user=</a:t>
+            </a:r>
+            <a:r>
+              <a:rPr lang="en-US" err="1"/>
+              <a:t>alice</a:t>
+            </a:r>
+            <a:r>
+              <a:rPr lang="en-US"/>
+              <a:t>, group=</a:t>
+            </a:r>
+            <a:r>
+              <a:rPr lang="en-US" err="1"/>
+              <a:t>diese</a:t>
+            </a:r>
+            <a:r>
+              <a:rPr lang="en-US"/>
+              <a:t>) : admin de </a:t>
+            </a:r>
+            <a:r>
+              <a:rPr lang="en-US" err="1"/>
+              <a:t>diese</a:t>
+            </a:r>
+            <a:endParaRPr lang="en-US"/>
+          </a:p>
+          <a:p>
+            <a:r>
+              <a:rPr lang="en-US"/>
+              <a:t>Role(type=WRITER, user=</a:t>
+            </a:r>
+            <a:r>
+              <a:rPr lang="en-US" err="1"/>
+              <a:t>alice</a:t>
+            </a:r>
+            <a:r>
+              <a:rPr lang="en-US"/>
+              <a:t>, group=</a:t>
+            </a:r>
+            <a:r>
+              <a:rPr lang="en-US" err="1"/>
+              <a:t>diese</a:t>
+            </a:r>
+            <a:r>
+              <a:rPr lang="en-US"/>
+              <a:t>) : droit </a:t>
+            </a:r>
+            <a:r>
+              <a:rPr lang="en-US" err="1"/>
+              <a:t>d’édition</a:t>
+            </a:r>
+            <a:r>
+              <a:rPr lang="en-US"/>
+              <a:t> de </a:t>
+            </a:r>
+            <a:r>
+              <a:rPr lang="en-US" err="1"/>
+              <a:t>diese</a:t>
+            </a:r>
+            <a:endParaRPr lang="en-US"/>
+          </a:p>
+        </p:txBody>
+      </p:sp>
+      <p:sp>
+        <p:nvSpPr>
+          <p:cNvPr id="42" name="ZoneTexte 41">
+            <a:extLst>
+              <a:ext uri="{FF2B5EF4-FFF2-40B4-BE49-F238E27FC236}">
+                <a16:creationId xmlns:a16="http://schemas.microsoft.com/office/drawing/2014/main" id="{8FA5E253-A0F4-6949-BA5B-B162001B53DF}"/>
+              </a:ext>
+            </a:extLst>
+          </p:cNvPr>
+          <p:cNvSpPr txBox="1"/>
+          <p:nvPr/>
+        </p:nvSpPr>
+        <p:spPr>
+          <a:xfrm>
+            <a:off x="997291" y="5285035"/>
+            <a:ext cx="6917266" cy="369332"/>
+          </a:xfrm>
+          <a:prstGeom prst="rect">
+            <a:avLst/>
+          </a:prstGeom>
+          <a:noFill/>
+        </p:spPr>
+        <p:txBody>
+          <a:bodyPr wrap="square" rtlCol="0">
+            <a:spAutoFit/>
+          </a:bodyPr>
+          <a:lstStyle/>
+          <a:p>
+            <a:r>
+              <a:rPr lang="en-US"/>
+              <a:t>Hierarchy des roles : READER &lt; WRITER &lt; RUNNER &lt; ADMIN</a:t>
+            </a:r>
+          </a:p>
+        </p:txBody>
+      </p:sp>
+      <p:sp>
+        <p:nvSpPr>
+          <p:cNvPr id="44" name="ZoneTexte 43">
+            <a:extLst>
+              <a:ext uri="{FF2B5EF4-FFF2-40B4-BE49-F238E27FC236}">
+                <a16:creationId xmlns:a16="http://schemas.microsoft.com/office/drawing/2014/main" id="{C3A345AE-82B4-E34C-8E71-9743A7AE717C}"/>
+              </a:ext>
+            </a:extLst>
+          </p:cNvPr>
+          <p:cNvSpPr txBox="1"/>
+          <p:nvPr/>
+        </p:nvSpPr>
+        <p:spPr>
+          <a:xfrm>
+            <a:off x="10405702" y="2755499"/>
+            <a:ext cx="984437" cy="830997"/>
+          </a:xfrm>
+          <a:prstGeom prst="rect">
+            <a:avLst/>
+          </a:prstGeom>
+          <a:noFill/>
+        </p:spPr>
+        <p:txBody>
+          <a:bodyPr wrap="none" rtlCol="0">
+            <a:spAutoFit/>
+          </a:bodyPr>
+          <a:lstStyle/>
           <a:p>
             <a:pPr marL="285750" indent="-285750">
               <a:buFont typeface="Arial" panose="020B0604020202020204" pitchFamily="34" charset="0"/>
@@ -8082,7 +8251,7 @@
             </a:pPr>
             <a:r>
               <a:rPr lang="en-US" sz="1200" b="1"/>
-              <a:t>User</a:t>
+              <a:t>Id study</a:t>
             </a:r>
           </a:p>
           <a:p>
@@ -8091,187 +8260,18 @@
               <a:buChar char="•"/>
             </a:pPr>
             <a:r>
-              <a:rPr lang="en-US" sz="1200" b="1"/>
-              <a:t>group</a:t>
-            </a:r>
-          </a:p>
-        </p:txBody>
-      </p:sp>
-      <p:sp>
-        <p:nvSpPr>
-          <p:cNvPr id="5" name="ZoneTexte 4">
-            <a:extLst>
-              <a:ext uri="{FF2B5EF4-FFF2-40B4-BE49-F238E27FC236}">
-                <a16:creationId xmlns:a16="http://schemas.microsoft.com/office/drawing/2014/main" id="{432F584D-5C78-6C43-9B21-44BAC122FF2F}"/>
-              </a:ext>
-            </a:extLst>
-          </p:cNvPr>
-          <p:cNvSpPr txBox="1"/>
-          <p:nvPr/>
-        </p:nvSpPr>
-        <p:spPr>
-          <a:xfrm>
-            <a:off x="1005703" y="4054962"/>
-            <a:ext cx="6917266" cy="923330"/>
-          </a:xfrm>
-          <a:prstGeom prst="rect">
-            <a:avLst/>
-          </a:prstGeom>
-          <a:noFill/>
-        </p:spPr>
-        <p:txBody>
-          <a:bodyPr wrap="square" rtlCol="0">
-            <a:spAutoFit/>
-          </a:bodyPr>
-          <a:lstStyle/>
-          <a:p>
-            <a:r>
-              <a:rPr lang="en-US"/>
-              <a:t>Role(type=ADMIN, user=</a:t>
-            </a:r>
-            <a:r>
-              <a:rPr lang="en-US" err="1"/>
-              <a:t>alice</a:t>
-            </a:r>
-            <a:r>
-              <a:rPr lang="en-US"/>
-              <a:t>, group=admin) : admin du server</a:t>
-            </a:r>
-          </a:p>
-          <a:p>
-            <a:r>
-              <a:rPr lang="en-US"/>
-              <a:t>Role(type=ADMIN, user=</a:t>
-            </a:r>
-            <a:r>
-              <a:rPr lang="en-US" err="1"/>
-              <a:t>alice</a:t>
-            </a:r>
-            <a:r>
-              <a:rPr lang="en-US"/>
-              <a:t>, group=</a:t>
-            </a:r>
-            <a:r>
-              <a:rPr lang="en-US" err="1"/>
-              <a:t>diese</a:t>
-            </a:r>
-            <a:r>
-              <a:rPr lang="en-US"/>
-              <a:t>) : admin de </a:t>
-            </a:r>
-            <a:r>
-              <a:rPr lang="en-US" err="1"/>
-              <a:t>diese</a:t>
-            </a:r>
-            <a:endParaRPr lang="en-US"/>
-          </a:p>
-          <a:p>
-            <a:r>
-              <a:rPr lang="en-US"/>
-              <a:t>Role(type=WRITER, user=</a:t>
-            </a:r>
-            <a:r>
-              <a:rPr lang="en-US" err="1"/>
-              <a:t>alice</a:t>
-            </a:r>
-            <a:r>
-              <a:rPr lang="en-US"/>
-              <a:t>, group=</a:t>
-            </a:r>
-            <a:r>
-              <a:rPr lang="en-US" err="1"/>
-              <a:t>diese</a:t>
-            </a:r>
-            <a:r>
-              <a:rPr lang="en-US"/>
-              <a:t>) : droit </a:t>
-            </a:r>
-            <a:r>
-              <a:rPr lang="en-US" err="1"/>
-              <a:t>d’édition</a:t>
-            </a:r>
-            <a:r>
-              <a:rPr lang="en-US"/>
-              <a:t> de </a:t>
-            </a:r>
-            <a:r>
-              <a:rPr lang="en-US" err="1"/>
-              <a:t>diese</a:t>
-            </a:r>
-            <a:endParaRPr lang="en-US"/>
-          </a:p>
-        </p:txBody>
-      </p:sp>
-      <p:sp>
-        <p:nvSpPr>
-          <p:cNvPr id="42" name="ZoneTexte 41">
-            <a:extLst>
-              <a:ext uri="{FF2B5EF4-FFF2-40B4-BE49-F238E27FC236}">
-                <a16:creationId xmlns:a16="http://schemas.microsoft.com/office/drawing/2014/main" id="{8FA5E253-A0F4-6949-BA5B-B162001B53DF}"/>
-              </a:ext>
-            </a:extLst>
-          </p:cNvPr>
-          <p:cNvSpPr txBox="1"/>
-          <p:nvPr/>
-        </p:nvSpPr>
-        <p:spPr>
-          <a:xfrm>
-            <a:off x="997291" y="5285035"/>
-            <a:ext cx="6917266" cy="369332"/>
-          </a:xfrm>
-          <a:prstGeom prst="rect">
-            <a:avLst/>
-          </a:prstGeom>
-          <a:noFill/>
-        </p:spPr>
-        <p:txBody>
-          <a:bodyPr wrap="square" rtlCol="0">
-            <a:spAutoFit/>
-          </a:bodyPr>
-          <a:lstStyle/>
-          <a:p>
-            <a:r>
-              <a:rPr lang="en-US"/>
-              <a:t>Hierarchy des roles : READER &lt; WRITER &lt; RUNNER &lt; ADMIN</a:t>
-            </a:r>
-          </a:p>
-        </p:txBody>
-      </p:sp>
-      <p:sp>
-        <p:nvSpPr>
-          <p:cNvPr id="44" name="ZoneTexte 43">
-            <a:extLst>
-              <a:ext uri="{FF2B5EF4-FFF2-40B4-BE49-F238E27FC236}">
-                <a16:creationId xmlns:a16="http://schemas.microsoft.com/office/drawing/2014/main" id="{C3A345AE-82B4-E34C-8E71-9743A7AE717C}"/>
-              </a:ext>
-            </a:extLst>
-          </p:cNvPr>
-          <p:cNvSpPr txBox="1"/>
-          <p:nvPr/>
-        </p:nvSpPr>
-        <p:spPr>
-          <a:xfrm>
-            <a:off x="8016185" y="2755499"/>
-            <a:ext cx="984437" cy="830997"/>
-          </a:xfrm>
-          <a:prstGeom prst="rect">
-            <a:avLst/>
-          </a:prstGeom>
-          <a:noFill/>
-        </p:spPr>
-        <p:txBody>
-          <a:bodyPr wrap="none" rtlCol="0">
-            <a:spAutoFit/>
-          </a:bodyPr>
-          <a:lstStyle/>
+              <a:rPr lang="en-US" sz="1200"/>
+              <a:t>Owner</a:t>
+            </a:r>
+          </a:p>
           <a:p>
             <a:pPr marL="285750" indent="-285750">
               <a:buFont typeface="Arial" panose="020B0604020202020204" pitchFamily="34" charset="0"/>
               <a:buChar char="•"/>
             </a:pPr>
             <a:r>
-              <a:rPr lang="en-US" sz="1200" b="1"/>
-              <a:t>Id study</a:t>
+              <a:rPr lang="en-US" sz="1200"/>
+              <a:t>Groups</a:t>
             </a:r>
           </a:p>
           <a:p>
@@ -8281,26 +8281,6 @@
             </a:pPr>
             <a:r>
               <a:rPr lang="en-US" sz="1200"/>
-              <a:t>Owner</a:t>
-            </a:r>
-          </a:p>
-          <a:p>
-            <a:pPr marL="285750" indent="-285750">
-              <a:buFont typeface="Arial" panose="020B0604020202020204" pitchFamily="34" charset="0"/>
-              <a:buChar char="•"/>
-            </a:pPr>
-            <a:r>
-              <a:rPr lang="en-US" sz="1200"/>
-              <a:t>Groups</a:t>
-            </a:r>
-          </a:p>
-          <a:p>
-            <a:pPr marL="285750" indent="-285750">
-              <a:buFont typeface="Arial" panose="020B0604020202020204" pitchFamily="34" charset="0"/>
-              <a:buChar char="•"/>
-            </a:pPr>
-            <a:r>
-              <a:rPr lang="en-US" sz="1200"/>
               <a:t>public</a:t>
             </a:r>
           </a:p>
@@ -8320,7 +8300,7 @@
         </p:nvSpPr>
         <p:spPr>
           <a:xfrm>
-            <a:off x="5667811" y="3124831"/>
+            <a:off x="8057328" y="3124831"/>
             <a:ext cx="45719" cy="415499"/>
           </a:xfrm>
           <a:prstGeom prst="leftBrace">
@@ -8365,7 +8345,7 @@
         </p:nvSpPr>
         <p:spPr>
           <a:xfrm>
-            <a:off x="5252474" y="3124831"/>
+            <a:off x="7641991" y="3124831"/>
             <a:ext cx="359394" cy="369332"/>
           </a:xfrm>
           <a:prstGeom prst="rect">
@@ -8386,6 +8366,314 @@
           </a:p>
         </p:txBody>
       </p:sp>
+      <p:sp>
+        <p:nvSpPr>
+          <p:cNvPr id="15" name="Rectangle 14">
+            <a:extLst>
+              <a:ext uri="{FF2B5EF4-FFF2-40B4-BE49-F238E27FC236}">
+                <a16:creationId xmlns:a16="http://schemas.microsoft.com/office/drawing/2014/main" id="{67A27E84-7D11-D048-9DC8-523748291CE6}"/>
+              </a:ext>
+            </a:extLst>
+          </p:cNvPr>
+          <p:cNvSpPr/>
+          <p:nvPr/>
+        </p:nvSpPr>
+        <p:spPr>
+          <a:xfrm>
+            <a:off x="5649377" y="2143619"/>
+            <a:ext cx="1403133" cy="420414"/>
+          </a:xfrm>
+          <a:prstGeom prst="rect">
+            <a:avLst/>
+          </a:prstGeom>
+          <a:noFill/>
+          <a:ln w="9525" cap="flat" cmpd="sng" algn="ctr">
+            <a:solidFill>
+              <a:schemeClr val="accent1"/>
+            </a:solidFill>
+            <a:prstDash val="solid"/>
+            <a:round/>
+            <a:headEnd type="none" w="med" len="med"/>
+            <a:tailEnd type="none" w="med" len="med"/>
+          </a:ln>
+        </p:spPr>
+        <p:style>
+          <a:lnRef idx="0">
+            <a:scrgbClr r="0" g="0" b="0"/>
+          </a:lnRef>
+          <a:fillRef idx="0">
+            <a:scrgbClr r="0" g="0" b="0"/>
+          </a:fillRef>
+          <a:effectRef idx="0">
+            <a:scrgbClr r="0" g="0" b="0"/>
+          </a:effectRef>
+          <a:fontRef idx="minor">
+            <a:schemeClr val="accent1"/>
+          </a:fontRef>
+        </p:style>
+        <p:txBody>
+          <a:bodyPr rtlCol="0" anchor="ctr"/>
+          <a:lstStyle/>
+          <a:p>
+            <a:pPr algn="ctr"/>
+            <a:r>
+              <a:rPr lang="en-US" dirty="0"/>
+              <a:t>bot</a:t>
+            </a:r>
+          </a:p>
+        </p:txBody>
+      </p:sp>
+      <p:sp>
+        <p:nvSpPr>
+          <p:cNvPr id="16" name="ZoneTexte 15">
+            <a:extLst>
+              <a:ext uri="{FF2B5EF4-FFF2-40B4-BE49-F238E27FC236}">
+                <a16:creationId xmlns:a16="http://schemas.microsoft.com/office/drawing/2014/main" id="{527B2712-C055-6C4E-B397-0E8AD494F977}"/>
+              </a:ext>
+            </a:extLst>
+          </p:cNvPr>
+          <p:cNvSpPr txBox="1"/>
+          <p:nvPr/>
+        </p:nvSpPr>
+        <p:spPr>
+          <a:xfrm>
+            <a:off x="5649377" y="2709333"/>
+            <a:ext cx="1318887" cy="461665"/>
+          </a:xfrm>
+          <a:prstGeom prst="rect">
+            <a:avLst/>
+          </a:prstGeom>
+          <a:noFill/>
+        </p:spPr>
+        <p:txBody>
+          <a:bodyPr wrap="none" rtlCol="0">
+            <a:spAutoFit/>
+          </a:bodyPr>
+          <a:lstStyle/>
+          <a:p>
+            <a:pPr marL="285750" indent="-285750">
+              <a:buFont typeface="Arial" panose="020B0604020202020204" pitchFamily="34" charset="0"/>
+              <a:buChar char="•"/>
+            </a:pPr>
+            <a:r>
+              <a:rPr lang="en-US" sz="1200" dirty="0"/>
+              <a:t>Owner</a:t>
+            </a:r>
+          </a:p>
+          <a:p>
+            <a:pPr marL="285750" indent="-285750">
+              <a:buFont typeface="Arial" panose="020B0604020202020204" pitchFamily="34" charset="0"/>
+              <a:buChar char="•"/>
+            </a:pPr>
+            <a:r>
+              <a:rPr lang="en-US" sz="1200" dirty="0"/>
+              <a:t>impersonator</a:t>
+            </a:r>
+          </a:p>
+        </p:txBody>
+      </p:sp>
+      <p:sp>
+        <p:nvSpPr>
+          <p:cNvPr id="17" name="Rectangle 16">
+            <a:extLst>
+              <a:ext uri="{FF2B5EF4-FFF2-40B4-BE49-F238E27FC236}">
+                <a16:creationId xmlns:a16="http://schemas.microsoft.com/office/drawing/2014/main" id="{A093FE5F-EB5E-8A40-A7D5-BAF2E3E47D8C}"/>
+              </a:ext>
+            </a:extLst>
+          </p:cNvPr>
+          <p:cNvSpPr/>
+          <p:nvPr/>
+        </p:nvSpPr>
+        <p:spPr>
+          <a:xfrm>
+            <a:off x="4464336" y="556075"/>
+            <a:ext cx="1403133" cy="420414"/>
+          </a:xfrm>
+          <a:prstGeom prst="rect">
+            <a:avLst/>
+          </a:prstGeom>
+          <a:noFill/>
+          <a:ln w="9525" cap="flat" cmpd="sng" algn="ctr">
+            <a:solidFill>
+              <a:schemeClr val="accent1"/>
+            </a:solidFill>
+            <a:prstDash val="solid"/>
+            <a:round/>
+            <a:headEnd type="none" w="med" len="med"/>
+            <a:tailEnd type="none" w="med" len="med"/>
+          </a:ln>
+        </p:spPr>
+        <p:style>
+          <a:lnRef idx="0">
+            <a:scrgbClr r="0" g="0" b="0"/>
+          </a:lnRef>
+          <a:fillRef idx="0">
+            <a:scrgbClr r="0" g="0" b="0"/>
+          </a:fillRef>
+          <a:effectRef idx="0">
+            <a:scrgbClr r="0" g="0" b="0"/>
+          </a:effectRef>
+          <a:fontRef idx="minor">
+            <a:schemeClr val="accent1"/>
+          </a:fontRef>
+        </p:style>
+        <p:txBody>
+          <a:bodyPr rtlCol="0" anchor="ctr"/>
+          <a:lstStyle/>
+          <a:p>
+            <a:pPr algn="ctr"/>
+            <a:r>
+              <a:rPr lang="en-US" dirty="0"/>
+              <a:t>Identity</a:t>
+            </a:r>
+          </a:p>
+        </p:txBody>
+      </p:sp>
+      <p:sp>
+        <p:nvSpPr>
+          <p:cNvPr id="18" name="ZoneTexte 17">
+            <a:extLst>
+              <a:ext uri="{FF2B5EF4-FFF2-40B4-BE49-F238E27FC236}">
+                <a16:creationId xmlns:a16="http://schemas.microsoft.com/office/drawing/2014/main" id="{FD6C21A4-2EB3-BC43-BF85-791B88760FDF}"/>
+              </a:ext>
+            </a:extLst>
+          </p:cNvPr>
+          <p:cNvSpPr txBox="1"/>
+          <p:nvPr/>
+        </p:nvSpPr>
+        <p:spPr>
+          <a:xfrm>
+            <a:off x="4464336" y="1097766"/>
+            <a:ext cx="1117614" cy="646331"/>
+          </a:xfrm>
+          <a:prstGeom prst="rect">
+            <a:avLst/>
+          </a:prstGeom>
+          <a:noFill/>
+        </p:spPr>
+        <p:txBody>
+          <a:bodyPr wrap="none" rtlCol="0">
+            <a:spAutoFit/>
+          </a:bodyPr>
+          <a:lstStyle/>
+          <a:p>
+            <a:pPr marL="285750" indent="-285750">
+              <a:buFont typeface="Arial" panose="020B0604020202020204" pitchFamily="34" charset="0"/>
+              <a:buChar char="•"/>
+            </a:pPr>
+            <a:r>
+              <a:rPr lang="en-US" sz="1200" b="1" dirty="0"/>
+              <a:t>Id</a:t>
+            </a:r>
+          </a:p>
+          <a:p>
+            <a:pPr marL="285750" indent="-285750">
+              <a:buFont typeface="Arial" panose="020B0604020202020204" pitchFamily="34" charset="0"/>
+              <a:buChar char="•"/>
+            </a:pPr>
+            <a:r>
+              <a:rPr lang="en-US" sz="1200" dirty="0"/>
+              <a:t>Username</a:t>
+            </a:r>
+          </a:p>
+          <a:p>
+            <a:pPr marL="285750" indent="-285750">
+              <a:buFont typeface="Arial" panose="020B0604020202020204" pitchFamily="34" charset="0"/>
+              <a:buChar char="•"/>
+            </a:pPr>
+            <a:r>
+              <a:rPr lang="en-US" sz="1200" dirty="0"/>
+              <a:t>type</a:t>
+            </a:r>
+          </a:p>
+        </p:txBody>
+      </p:sp>
+      <p:cxnSp>
+        <p:nvCxnSpPr>
+          <p:cNvPr id="8" name="Connecteur en angle 7">
+            <a:extLst>
+              <a:ext uri="{FF2B5EF4-FFF2-40B4-BE49-F238E27FC236}">
+                <a16:creationId xmlns:a16="http://schemas.microsoft.com/office/drawing/2014/main" id="{F5F0B5B8-3C40-1E48-9798-D6D90136C3AC}"/>
+              </a:ext>
+            </a:extLst>
+          </p:cNvPr>
+          <p:cNvCxnSpPr>
+            <a:cxnSpLocks/>
+            <a:stCxn id="25" idx="0"/>
+            <a:endCxn id="17" idx="1"/>
+          </p:cNvCxnSpPr>
+          <p:nvPr/>
+        </p:nvCxnSpPr>
+        <p:spPr>
+          <a:xfrm rot="5400000" flipH="1" flipV="1">
+            <a:off x="3555632" y="1258939"/>
+            <a:ext cx="1401360" cy="416047"/>
+          </a:xfrm>
+          <a:prstGeom prst="bentConnector2">
+            <a:avLst/>
+          </a:prstGeom>
+          <a:ln>
+            <a:tailEnd type="triangle"/>
+          </a:ln>
+        </p:spPr>
+        <p:style>
+          <a:lnRef idx="1">
+            <a:schemeClr val="accent1"/>
+          </a:lnRef>
+          <a:fillRef idx="0">
+            <a:schemeClr val="accent1"/>
+          </a:fillRef>
+          <a:effectRef idx="0">
+            <a:schemeClr val="accent1"/>
+          </a:effectRef>
+          <a:fontRef idx="minor">
+            <a:schemeClr val="tx1"/>
+          </a:fontRef>
+        </p:style>
+      </p:cxnSp>
+      <p:cxnSp>
+        <p:nvCxnSpPr>
+          <p:cNvPr id="22" name="Connecteur en angle 21">
+            <a:extLst>
+              <a:ext uri="{FF2B5EF4-FFF2-40B4-BE49-F238E27FC236}">
+                <a16:creationId xmlns:a16="http://schemas.microsoft.com/office/drawing/2014/main" id="{91732A5A-958E-984B-B823-FA6D1413A02D}"/>
+              </a:ext>
+            </a:extLst>
+          </p:cNvPr>
+          <p:cNvCxnSpPr>
+            <a:cxnSpLocks/>
+            <a:stCxn id="15" idx="0"/>
+            <a:endCxn id="17" idx="3"/>
+          </p:cNvCxnSpPr>
+          <p:nvPr/>
+        </p:nvCxnSpPr>
+        <p:spPr>
+          <a:xfrm rot="16200000" flipV="1">
+            <a:off x="5420539" y="1213213"/>
+            <a:ext cx="1377337" cy="483475"/>
+          </a:xfrm>
+          <a:prstGeom prst="bentConnector2">
+            <a:avLst/>
+          </a:prstGeom>
+          <a:ln>
+            <a:tailEnd type="triangle"/>
+          </a:ln>
+        </p:spPr>
+        <p:style>
+          <a:lnRef idx="1">
+            <a:schemeClr val="accent1"/>
+          </a:lnRef>
+          <a:fillRef idx="0">
+            <a:schemeClr val="accent1"/>
+          </a:fillRef>
+          <a:effectRef idx="0">
+            <a:schemeClr val="accent1"/>
+          </a:effectRef>
+          <a:fontRef idx="minor">
+            <a:schemeClr val="tx1"/>
+          </a:fontRef>
+        </p:style>
+      </p:cxnSp>
     </p:spTree>
     <p:extLst>
       <p:ext uri="{BB962C8B-B14F-4D97-AF65-F5344CB8AC3E}">
@@ -8438,7 +8726,7 @@
           <a:lstStyle/>
           <a:p>
             <a:r>
-              <a:rPr lang="en-US"/>
+              <a:rPr lang="en-US" dirty="0"/>
               <a:t>login</a:t>
             </a:r>
           </a:p>
@@ -8458,7 +8746,7 @@
         </p:nvCxnSpPr>
         <p:spPr>
           <a:xfrm>
-            <a:off x="1397876" y="2511973"/>
+            <a:off x="354079" y="2421559"/>
             <a:ext cx="0" cy="3100552"/>
           </a:xfrm>
           <a:prstGeom prst="line">
@@ -8495,8 +8783,8 @@
         </p:nvSpPr>
         <p:spPr>
           <a:xfrm>
-            <a:off x="1101961" y="2049517"/>
-            <a:ext cx="591829" cy="369332"/>
+            <a:off x="150737" y="2020871"/>
+            <a:ext cx="617477" cy="369332"/>
           </a:xfrm>
           <a:prstGeom prst="rect">
             <a:avLst/>
@@ -8511,8 +8799,8 @@
           <a:p>
             <a:pPr algn="ctr"/>
             <a:r>
-              <a:rPr lang="en-US"/>
-              <a:t>user</a:t>
+              <a:rPr lang="en-US" dirty="0"/>
+              <a:t>User</a:t>
             </a:r>
           </a:p>
         </p:txBody>
@@ -8680,8 +8968,8 @@
         </p:nvCxnSpPr>
         <p:spPr>
           <a:xfrm>
-            <a:off x="1397876" y="3026979"/>
-            <a:ext cx="2809512" cy="0"/>
+            <a:off x="354079" y="3026979"/>
+            <a:ext cx="3853309" cy="0"/>
           </a:xfrm>
           <a:prstGeom prst="straightConnector1">
             <a:avLst/>
@@ -8803,8 +9091,8 @@
         </p:nvCxnSpPr>
         <p:spPr>
           <a:xfrm flipH="1">
-            <a:off x="1397877" y="4572000"/>
-            <a:ext cx="2809511" cy="0"/>
+            <a:off x="354079" y="5037827"/>
+            <a:ext cx="3853308" cy="0"/>
           </a:xfrm>
           <a:prstGeom prst="straightConnector1">
             <a:avLst/>
@@ -9065,6 +9353,200 @@
           </a:prstGeom>
         </p:spPr>
       </p:pic>
+      <p:sp>
+        <p:nvSpPr>
+          <p:cNvPr id="3" name="ZoneTexte 2">
+            <a:extLst>
+              <a:ext uri="{FF2B5EF4-FFF2-40B4-BE49-F238E27FC236}">
+                <a16:creationId xmlns:a16="http://schemas.microsoft.com/office/drawing/2014/main" id="{6A1E6CB8-C6CD-3242-855A-20126B3F440A}"/>
+              </a:ext>
+            </a:extLst>
+          </p:cNvPr>
+          <p:cNvSpPr txBox="1"/>
+          <p:nvPr/>
+        </p:nvSpPr>
+        <p:spPr>
+          <a:xfrm>
+            <a:off x="459476" y="3297157"/>
+            <a:ext cx="1393330" cy="1200329"/>
+          </a:xfrm>
+          <a:prstGeom prst="rect">
+            <a:avLst/>
+          </a:prstGeom>
+          <a:noFill/>
+        </p:spPr>
+        <p:txBody>
+          <a:bodyPr wrap="none" rtlCol="0">
+            <a:spAutoFit/>
+          </a:bodyPr>
+          <a:lstStyle/>
+          <a:p>
+            <a:r>
+              <a:rPr lang="en-US" sz="1200" dirty="0" err="1">
+                <a:latin typeface="Courier" pitchFamily="2" charset="0"/>
+              </a:rPr>
+              <a:t>UserDTO</a:t>
+            </a:r>
+            <a:r>
+              <a:rPr lang="en-US" sz="1200" dirty="0">
+                <a:latin typeface="Courier" pitchFamily="2" charset="0"/>
+              </a:rPr>
+              <a:t> {</a:t>
+            </a:r>
+          </a:p>
+          <a:p>
+            <a:r>
+              <a:rPr lang="en-US" sz="1200" dirty="0">
+                <a:latin typeface="Courier" pitchFamily="2" charset="0"/>
+              </a:rPr>
+              <a:t>    Username</a:t>
+            </a:r>
+          </a:p>
+          <a:p>
+            <a:r>
+              <a:rPr lang="en-US" sz="1200" dirty="0">
+                <a:latin typeface="Courier" pitchFamily="2" charset="0"/>
+              </a:rPr>
+              <a:t>    Password</a:t>
+            </a:r>
+          </a:p>
+          <a:p>
+            <a:r>
+              <a:rPr lang="en-US" sz="1200" dirty="0">
+                <a:latin typeface="Courier" pitchFamily="2" charset="0"/>
+              </a:rPr>
+              <a:t>}</a:t>
+            </a:r>
+          </a:p>
+          <a:p>
+            <a:endParaRPr lang="en-US" sz="1200" dirty="0">
+              <a:latin typeface="Courier" pitchFamily="2" charset="0"/>
+            </a:endParaRPr>
+          </a:p>
+          <a:p>
+            <a:r>
+              <a:rPr lang="en-US" sz="1200" dirty="0">
+                <a:latin typeface="Courier" pitchFamily="2" charset="0"/>
+              </a:rPr>
+              <a:t>Return </a:t>
+            </a:r>
+            <a:r>
+              <a:rPr lang="en-US" sz="1200" dirty="0" err="1">
+                <a:latin typeface="Courier" pitchFamily="2" charset="0"/>
+              </a:rPr>
+              <a:t>UserId</a:t>
+            </a:r>
+            <a:endParaRPr lang="en-US" sz="1200" dirty="0">
+              <a:latin typeface="Courier" pitchFamily="2" charset="0"/>
+            </a:endParaRPr>
+          </a:p>
+        </p:txBody>
+      </p:sp>
+      <p:sp>
+        <p:nvSpPr>
+          <p:cNvPr id="21" name="ZoneTexte 20">
+            <a:extLst>
+              <a:ext uri="{FF2B5EF4-FFF2-40B4-BE49-F238E27FC236}">
+                <a16:creationId xmlns:a16="http://schemas.microsoft.com/office/drawing/2014/main" id="{111C1983-4456-484B-989E-F71D2857D71D}"/>
+              </a:ext>
+            </a:extLst>
+          </p:cNvPr>
+          <p:cNvSpPr txBox="1"/>
+          <p:nvPr/>
+        </p:nvSpPr>
+        <p:spPr>
+          <a:xfrm>
+            <a:off x="2280733" y="3297157"/>
+            <a:ext cx="1579278" cy="1569660"/>
+          </a:xfrm>
+          <a:prstGeom prst="rect">
+            <a:avLst/>
+          </a:prstGeom>
+          <a:noFill/>
+        </p:spPr>
+        <p:txBody>
+          <a:bodyPr wrap="none" rtlCol="0">
+            <a:spAutoFit/>
+          </a:bodyPr>
+          <a:lstStyle/>
+          <a:p>
+            <a:r>
+              <a:rPr lang="en-US" sz="1200" dirty="0" err="1">
+                <a:latin typeface="Courier" pitchFamily="2" charset="0"/>
+              </a:rPr>
+              <a:t>BotDTO</a:t>
+            </a:r>
+            <a:r>
+              <a:rPr lang="en-US" sz="1200" dirty="0">
+                <a:latin typeface="Courier" pitchFamily="2" charset="0"/>
+              </a:rPr>
+              <a:t> {</a:t>
+            </a:r>
+          </a:p>
+          <a:p>
+            <a:r>
+              <a:rPr lang="en-US" sz="1200" dirty="0">
+                <a:latin typeface="Courier" pitchFamily="2" charset="0"/>
+              </a:rPr>
+              <a:t>    </a:t>
+            </a:r>
+            <a:r>
+              <a:rPr lang="en-US" sz="1200" dirty="0" err="1">
+                <a:latin typeface="Courier" pitchFamily="2" charset="0"/>
+              </a:rPr>
+              <a:t>botname</a:t>
+            </a:r>
+            <a:endParaRPr lang="en-US" sz="1200" dirty="0">
+              <a:latin typeface="Courier" pitchFamily="2" charset="0"/>
+            </a:endParaRPr>
+          </a:p>
+          <a:p>
+            <a:r>
+              <a:rPr lang="en-US" sz="1200" dirty="0">
+                <a:latin typeface="Courier" pitchFamily="2" charset="0"/>
+              </a:rPr>
+              <a:t>    group</a:t>
+            </a:r>
+          </a:p>
+          <a:p>
+            <a:r>
+              <a:rPr lang="en-US" sz="1200" dirty="0">
+                <a:latin typeface="Courier" pitchFamily="2" charset="0"/>
+              </a:rPr>
+              <a:t>    roles</a:t>
+            </a:r>
+          </a:p>
+          <a:p>
+            <a:r>
+              <a:rPr lang="en-US" sz="1200" dirty="0">
+                <a:latin typeface="Courier" pitchFamily="2" charset="0"/>
+              </a:rPr>
+              <a:t>    owner: bool</a:t>
+            </a:r>
+          </a:p>
+          <a:p>
+            <a:r>
+              <a:rPr lang="en-US" sz="1200" dirty="0">
+                <a:latin typeface="Courier" pitchFamily="2" charset="0"/>
+              </a:rPr>
+              <a:t>}</a:t>
+            </a:r>
+          </a:p>
+          <a:p>
+            <a:endParaRPr lang="en-US" sz="1200" dirty="0">
+              <a:latin typeface="Courier" pitchFamily="2" charset="0"/>
+            </a:endParaRPr>
+          </a:p>
+          <a:p>
+            <a:r>
+              <a:rPr lang="en-US" sz="1200" dirty="0">
+                <a:latin typeface="Courier" pitchFamily="2" charset="0"/>
+              </a:rPr>
+              <a:t>Return JWT</a:t>
+            </a:r>
+          </a:p>
+        </p:txBody>
+      </p:sp>
     </p:spTree>
     <p:extLst>
       <p:ext uri="{BB962C8B-B14F-4D97-AF65-F5344CB8AC3E}">
@@ -9174,8 +9656,8 @@
         </p:nvSpPr>
         <p:spPr>
           <a:xfrm>
-            <a:off x="1101961" y="2049517"/>
-            <a:ext cx="591829" cy="369332"/>
+            <a:off x="1089137" y="2049517"/>
+            <a:ext cx="617477" cy="369332"/>
           </a:xfrm>
           <a:prstGeom prst="rect">
             <a:avLst/>
@@ -9190,8 +9672,8 @@
           <a:p>
             <a:pPr algn="ctr"/>
             <a:r>
-              <a:rPr lang="en-US"/>
-              <a:t>user</a:t>
+              <a:rPr lang="en-US" dirty="0"/>
+              <a:t>User</a:t>
             </a:r>
           </a:p>
         </p:txBody>
@@ -10747,14 +11229,14 @@
           <p:nvPr>
             <p:extLst>
               <p:ext uri="{D42A27DB-BD31-4B8C-83A1-F6EECF244321}">
-                <p14:modId xmlns:p14="http://schemas.microsoft.com/office/powerpoint/2010/main" val="2094093077"/>
+                <p14:modId xmlns:p14="http://schemas.microsoft.com/office/powerpoint/2010/main" val="3893566250"/>
               </p:ext>
             </p:extLst>
           </p:nvPr>
         </p:nvGraphicFramePr>
         <p:xfrm>
           <a:off x="539015" y="2338939"/>
-          <a:ext cx="11194180" cy="2984935"/>
+          <a:ext cx="11194180" cy="4366695"/>
         </p:xfrm>
         <a:graphic>
           <a:graphicData uri="http://schemas.openxmlformats.org/drawingml/2006/table">
@@ -10763,14 +11245,14 @@
                 <a:tableStyleId>{C083E6E3-FA7D-4D7B-A595-EF9225AFEA82}</a:tableStyleId>
               </a:tblPr>
               <a:tblGrid>
-                <a:gridCol w="1732547">
+                <a:gridCol w="1755611">
                   <a:extLst>
                     <a:ext uri="{9D8B030D-6E8A-4147-A177-3AD203B41FA5}">
                       <a16:colId xmlns:a16="http://schemas.microsoft.com/office/drawing/2014/main" val="2909901128"/>
                     </a:ext>
                   </a:extLst>
                 </a:gridCol>
-                <a:gridCol w="5730240">
+                <a:gridCol w="5707176">
                   <a:extLst>
                     <a:ext uri="{9D8B030D-6E8A-4147-A177-3AD203B41FA5}">
                       <a16:colId xmlns:a16="http://schemas.microsoft.com/office/drawing/2014/main" val="736002328"/>
@@ -10806,8 +11288,8 @@
                     <a:lstStyle/>
                     <a:p>
                       <a:r>
-                        <a:rPr lang="en-US"/>
-                        <a:t>scope</a:t>
+                        <a:rPr lang="en-US" dirty="0"/>
+                        <a:t>comments</a:t>
                       </a:r>
                     </a:p>
                   </a:txBody>
@@ -10980,7 +11462,54 @@
                     <a:lstStyle/>
                     <a:p>
                       <a:r>
-                        <a:rPr lang="en-US"/>
+                        <a:rPr lang="en-US" dirty="0"/>
+                        <a:t>Create bot</a:t>
+                      </a:r>
+                    </a:p>
+                  </a:txBody>
+                  <a:tcPr/>
+                </a:tc>
+                <a:tc>
+                  <a:txBody>
+                    <a:bodyPr/>
+                    <a:lstStyle/>
+                    <a:p>
+                      <a:r>
+                        <a:rPr lang="en-US" dirty="0"/>
+                        <a:t>Accept only same permission than user</a:t>
+                      </a:r>
+                    </a:p>
+                  </a:txBody>
+                  <a:tcPr/>
+                </a:tc>
+                <a:tc>
+                  <a:txBody>
+                    <a:bodyPr/>
+                    <a:lstStyle/>
+                    <a:p>
+                      <a:r>
+                        <a:rPr lang="en-US" dirty="0" err="1"/>
+                        <a:t>User.Id</a:t>
+                      </a:r>
+                      <a:endParaRPr lang="en-US" dirty="0"/>
+                    </a:p>
+                  </a:txBody>
+                  <a:tcPr/>
+                </a:tc>
+                <a:extLst>
+                  <a:ext uri="{0D108BD9-81ED-4DB2-BD59-A6C34878D82A}">
+                    <a16:rowId xmlns:a16="http://schemas.microsoft.com/office/drawing/2014/main" val="1905986350"/>
+                  </a:ext>
+                </a:extLst>
+              </a:tr>
+              <a:tr h="370840">
+                <a:tc>
+                  <a:txBody>
+                    <a:bodyPr/>
+                    <a:lstStyle/>
+                    <a:p>
+                      <a:r>
+                        <a:rPr lang="en-US" dirty="0"/>
                         <a:t>Create user</a:t>
                       </a:r>
                     </a:p>
@@ -10993,7 +11522,7 @@
                     <a:lstStyle/>
                     <a:p>
                       <a:r>
-                        <a:rPr lang="en-US"/>
+                        <a:rPr lang="en-US" dirty="0"/>
                         <a:t>*</a:t>
                       </a:r>
                     </a:p>
@@ -11026,7 +11555,78 @@
                     <a:lstStyle/>
                     <a:p>
                       <a:r>
-                        <a:rPr lang="en-US"/>
+                        <a:rPr lang="en-US" dirty="0"/>
+                        <a:t>Delete bot</a:t>
+                      </a:r>
+                    </a:p>
+                  </a:txBody>
+                  <a:tcPr/>
+                </a:tc>
+                <a:tc>
+                  <a:txBody>
+                    <a:bodyPr/>
+                    <a:lstStyle/>
+                    <a:p>
+                      <a:r>
+                        <a:rPr lang="en-US" dirty="0"/>
+                        <a:t>*</a:t>
+                      </a:r>
+                    </a:p>
+                  </a:txBody>
+                  <a:tcPr/>
+                </a:tc>
+                <a:tc>
+                  <a:txBody>
+                    <a:bodyPr/>
+                    <a:lstStyle/>
+                    <a:p>
+                      <a:pPr marL="0" marR="0" lvl="0" indent="0" algn="l" defTabSz="914400" rtl="0" eaLnBrk="1" fontAlgn="auto" latinLnBrk="0" hangingPunct="1">
+                        <a:lnSpc>
+                          <a:spcPct val="100000"/>
+                        </a:lnSpc>
+                        <a:spcBef>
+                          <a:spcPts val="0"/>
+                        </a:spcBef>
+                        <a:spcAft>
+                          <a:spcPts val="0"/>
+                        </a:spcAft>
+                        <a:buClrTx/>
+                        <a:buSzTx/>
+                        <a:buFontTx/>
+                        <a:buNone/>
+                        <a:tabLst/>
+                        <a:defRPr/>
+                      </a:pPr>
+                      <a:r>
+                        <a:rPr lang="en-US" dirty="0" err="1">
+                          <a:latin typeface="Courier" pitchFamily="2" charset="0"/>
+                        </a:rPr>
+                        <a:t>User.Id</a:t>
+                      </a:r>
+                      <a:r>
+                        <a:rPr lang="en-US" dirty="0">
+                          <a:latin typeface="Courier" pitchFamily="2" charset="0"/>
+                        </a:rPr>
+                        <a:t>, Admin</a:t>
+                      </a:r>
+                    </a:p>
+                  </a:txBody>
+                  <a:tcPr/>
+                </a:tc>
+                <a:extLst>
+                  <a:ext uri="{0D108BD9-81ED-4DB2-BD59-A6C34878D82A}">
+                    <a16:rowId xmlns:a16="http://schemas.microsoft.com/office/drawing/2014/main" val="2822939541"/>
+                  </a:ext>
+                </a:extLst>
+              </a:tr>
+              <a:tr h="370840">
+                <a:tc>
+                  <a:txBody>
+                    <a:bodyPr/>
+                    <a:lstStyle/>
+                    <a:p>
+                      <a:r>
+                        <a:rPr lang="en-US" dirty="0"/>
                         <a:t>Delete user</a:t>
                       </a:r>
                     </a:p>
@@ -11039,8 +11639,8 @@
                     <a:lstStyle/>
                     <a:p>
                       <a:r>
-                        <a:rPr lang="en-US"/>
-                        <a:t>*</a:t>
+                        <a:rPr lang="en-US" dirty="0"/>
+                        <a:t>Delete all bots owned by user</a:t>
                       </a:r>
                     </a:p>
                   </a:txBody>
@@ -11096,6 +11696,70 @@
                     <a:lstStyle/>
                     <a:p>
                       <a:r>
+                        <a:rPr lang="en-US" dirty="0"/>
+                        <a:t>Get bots</a:t>
+                      </a:r>
+                    </a:p>
+                  </a:txBody>
+                  <a:tcPr/>
+                </a:tc>
+                <a:tc>
+                  <a:txBody>
+                    <a:bodyPr/>
+                    <a:lstStyle/>
+                    <a:p>
+                      <a:r>
+                        <a:rPr lang="en-US" dirty="0"/>
+                        <a:t>Only bots owned by user</a:t>
+                      </a:r>
+                    </a:p>
+                  </a:txBody>
+                  <a:tcPr/>
+                </a:tc>
+                <a:tc>
+                  <a:txBody>
+                    <a:bodyPr/>
+                    <a:lstStyle/>
+                    <a:p>
+                      <a:pPr marL="0" marR="0" lvl="0" indent="0" algn="l" defTabSz="914400" rtl="0" eaLnBrk="1" fontAlgn="auto" latinLnBrk="0" hangingPunct="1">
+                        <a:lnSpc>
+                          <a:spcPct val="100000"/>
+                        </a:lnSpc>
+                        <a:spcBef>
+                          <a:spcPts val="0"/>
+                        </a:spcBef>
+                        <a:spcAft>
+                          <a:spcPts val="0"/>
+                        </a:spcAft>
+                        <a:buClrTx/>
+                        <a:buSzTx/>
+                        <a:buFontTx/>
+                        <a:buNone/>
+                        <a:tabLst/>
+                        <a:defRPr/>
+                      </a:pPr>
+                      <a:r>
+                        <a:rPr lang="en-US" dirty="0" err="1"/>
+                        <a:t>User.id</a:t>
+                      </a:r>
+                      <a:endParaRPr lang="en-US" dirty="0"/>
+                    </a:p>
+                  </a:txBody>
+                  <a:tcPr/>
+                </a:tc>
+                <a:extLst>
+                  <a:ext uri="{0D108BD9-81ED-4DB2-BD59-A6C34878D82A}">
+                    <a16:rowId xmlns:a16="http://schemas.microsoft.com/office/drawing/2014/main" val="4147530812"/>
+                  </a:ext>
+                </a:extLst>
+              </a:tr>
+              <a:tr h="370840">
+                <a:tc>
+                  <a:txBody>
+                    <a:bodyPr/>
+                    <a:lstStyle/>
+                    <a:p>
+                      <a:r>
                         <a:rPr lang="en-US"/>
                         <a:t>Get user</a:t>
                       </a:r>
@@ -11109,7 +11773,7 @@
                     <a:lstStyle/>
                     <a:p>
                       <a:r>
-                        <a:rPr lang="en-US"/>
+                        <a:rPr lang="en-US" dirty="0"/>
                         <a:t>*</a:t>
                       </a:r>
                     </a:p>
@@ -11226,8 +11890,8 @@
                     <a:lstStyle/>
                     <a:p>
                       <a:r>
-                        <a:rPr lang="en-US"/>
-                        <a:t>Get all</a:t>
+                        <a:rPr lang="en-US" dirty="0"/>
+                        <a:t>Get all user / bots</a:t>
                       </a:r>
                     </a:p>
                   </a:txBody>
@@ -11252,7 +11916,7 @@
                     <a:lstStyle/>
                     <a:p>
                       <a:r>
-                        <a:rPr lang="en-US"/>
+                        <a:rPr lang="en-US" dirty="0"/>
                         <a:t>ADMIN</a:t>
                       </a:r>
                     </a:p>

</xml_diff>